<commit_message>
Updated pptx file with data path of MP3 Player
</commit_message>
<xml_diff>
--- a/MP3 Player ISA.pptx
+++ b/MP3 Player ISA.pptx
@@ -20,26 +20,35 @@
     <p:sldId id="265" r:id="rId14"/>
     <p:sldId id="266" r:id="rId15"/>
     <p:sldId id="267" r:id="rId16"/>
+    <p:sldId id="268" r:id="rId17"/>
+    <p:sldId id="269" r:id="rId18"/>
+    <p:sldId id="270" r:id="rId19"/>
+    <p:sldId id="271" r:id="rId20"/>
+    <p:sldId id="272" r:id="rId21"/>
+    <p:sldId id="273" r:id="rId22"/>
+    <p:sldId id="274" r:id="rId23"/>
+    <p:sldId id="275" r:id="rId24"/>
+    <p:sldId id="276" r:id="rId25"/>
   </p:sldIdLst>
   <p:sldSz cy="5143500" cx="9144000"/>
   <p:notesSz cx="6858000" cy="9144000"/>
   <p:embeddedFontLst>
     <p:embeddedFont>
       <p:font typeface="Roboto"/>
-      <p:regular r:id="rId17"/>
-      <p:bold r:id="rId18"/>
-      <p:italic r:id="rId19"/>
-      <p:boldItalic r:id="rId20"/>
+      <p:regular r:id="rId26"/>
+      <p:bold r:id="rId27"/>
+      <p:italic r:id="rId28"/>
+      <p:boldItalic r:id="rId29"/>
     </p:embeddedFont>
     <p:embeddedFont>
       <p:font typeface="Amatic SC"/>
-      <p:regular r:id="rId21"/>
-      <p:bold r:id="rId22"/>
+      <p:regular r:id="rId30"/>
+      <p:bold r:id="rId31"/>
     </p:embeddedFont>
     <p:embeddedFont>
       <p:font typeface="Source Code Pro"/>
-      <p:regular r:id="rId23"/>
-      <p:bold r:id="rId24"/>
+      <p:regular r:id="rId32"/>
+      <p:bold r:id="rId33"/>
     </p:embeddedFont>
   </p:embeddedFontLst>
   <p:defaultTextStyle>
@@ -795,6 +804,815 @@
           </a:bodyPr>
           <a:lstStyle/>
           <a:p>
+            <a:pPr indent="-228600" lvl="0" marL="457200" rtl="0">
+              <a:spcBef>
+                <a:spcPts val="0"/>
+              </a:spcBef>
+              <a:buAutoNum type="arabicPeriod"/>
+            </a:pPr>
+            <a:r>
+              <a:rPr lang="en"/>
+              <a:t>We will be using trap and interrupt handlers for any inconve</a:t>
+            </a:r>
+          </a:p>
+          <a:p>
+            <a:pPr indent="-228600" lvl="0" marL="457200" rtl="0">
+              <a:spcBef>
+                <a:spcPts val="0"/>
+              </a:spcBef>
+              <a:buAutoNum type="arabicPeriod"/>
+            </a:pPr>
+            <a:r>
+              <a:rPr lang="en"/>
+              <a:t>nience of errors or multiple calls of functions.</a:t>
+            </a:r>
+          </a:p>
+          <a:p>
+            <a:pPr indent="-228600" lvl="0" marL="457200" rtl="0">
+              <a:spcBef>
+                <a:spcPts val="0"/>
+              </a:spcBef>
+              <a:buAutoNum type="arabicPeriod"/>
+            </a:pPr>
+            <a:r>
+              <a:rPr lang="en"/>
+              <a:t>Output handler which shows on the screen how output is coming.</a:t>
+            </a:r>
+          </a:p>
+        </p:txBody>
+      </p:sp>
+    </p:spTree>
+  </p:cSld>
+  <p:clrMapOvr>
+    <a:masterClrMapping/>
+  </p:clrMapOvr>
+</p:notes>
+</file>
+
+<file path=ppt/notesSlides/notesSlide13.xml><?xml version="1.0" encoding="utf-8"?>
+<p:notes xmlns:a="http://schemas.openxmlformats.org/drawingml/2006/main" xmlns:r="http://schemas.openxmlformats.org/officeDocument/2006/relationships" xmlns:mc="http://schemas.openxmlformats.org/markup-compatibility/2006" xmlns:mv="urn:schemas-microsoft-com:mac:vml" xmlns:p="http://schemas.openxmlformats.org/presentationml/2006/main" xmlns:c="http://schemas.openxmlformats.org/drawingml/2006/chart" xmlns:dgm="http://schemas.openxmlformats.org/drawingml/2006/diagram" xmlns:o="urn:schemas-microsoft-com:office:office" xmlns:v="urn:schemas-microsoft-com:vml" xmlns:pvml="urn:schemas-microsoft-com:office:powerpoint" xmlns:com="http://schemas.openxmlformats.org/drawingml/2006/compatibility" xmlns:p14="http://schemas.microsoft.com/office/powerpoint/2010/main" showMasterPhAnim="0" showMasterSp="0">
+  <p:cSld>
+    <p:spTree>
+      <p:nvGrpSpPr>
+        <p:cNvPr id="128" name="Shape 128"/>
+        <p:cNvGrpSpPr/>
+        <p:nvPr/>
+      </p:nvGrpSpPr>
+      <p:grpSpPr>
+        <a:xfrm>
+          <a:off x="0" y="0"/>
+          <a:ext cx="0" cy="0"/>
+          <a:chOff x="0" y="0"/>
+          <a:chExt cx="0" cy="0"/>
+        </a:xfrm>
+      </p:grpSpPr>
+      <p:sp>
+        <p:nvSpPr>
+          <p:cNvPr id="129" name="Shape 129"/>
+          <p:cNvSpPr/>
+          <p:nvPr>
+            <p:ph idx="2" type="sldImg"/>
+          </p:nvPr>
+        </p:nvSpPr>
+        <p:spPr>
+          <a:xfrm>
+            <a:off x="381300" y="685800"/>
+            <a:ext cx="6096000" cy="3429000"/>
+          </a:xfrm>
+          <a:custGeom>
+            <a:pathLst>
+              <a:path extrusionOk="0" h="120000" w="120000">
+                <a:moveTo>
+                  <a:pt x="0" y="0"/>
+                </a:moveTo>
+                <a:lnTo>
+                  <a:pt x="120000" y="0"/>
+                </a:lnTo>
+                <a:lnTo>
+                  <a:pt x="120000" y="120000"/>
+                </a:lnTo>
+                <a:lnTo>
+                  <a:pt x="0" y="120000"/>
+                </a:lnTo>
+                <a:close/>
+              </a:path>
+            </a:pathLst>
+          </a:custGeom>
+        </p:spPr>
+      </p:sp>
+      <p:sp>
+        <p:nvSpPr>
+          <p:cNvPr id="130" name="Shape 130"/>
+          <p:cNvSpPr txBox="1"/>
+          <p:nvPr>
+            <p:ph idx="1" type="body"/>
+          </p:nvPr>
+        </p:nvSpPr>
+        <p:spPr>
+          <a:xfrm>
+            <a:off x="685800" y="4343400"/>
+            <a:ext cx="5486400" cy="4114800"/>
+          </a:xfrm>
+          <a:prstGeom prst="rect">
+            <a:avLst/>
+          </a:prstGeom>
+        </p:spPr>
+        <p:txBody>
+          <a:bodyPr anchorCtr="0" anchor="t" bIns="91425" lIns="91425" rIns="91425" tIns="91425">
+            <a:noAutofit/>
+          </a:bodyPr>
+          <a:lstStyle/>
+          <a:p>
+            <a:pPr indent="-228600" lvl="0" marL="457200" rtl="0">
+              <a:spcBef>
+                <a:spcPts val="0"/>
+              </a:spcBef>
+              <a:buAutoNum type="arabicPeriod"/>
+            </a:pPr>
+            <a:r>
+              <a:rPr lang="en"/>
+              <a:t>We will be using trap and interrupt handlers for any inconve</a:t>
+            </a:r>
+          </a:p>
+          <a:p>
+            <a:pPr indent="-228600" lvl="0" marL="457200" rtl="0">
+              <a:spcBef>
+                <a:spcPts val="0"/>
+              </a:spcBef>
+              <a:buAutoNum type="arabicPeriod"/>
+            </a:pPr>
+            <a:r>
+              <a:rPr lang="en"/>
+              <a:t>nience of errors or multiple calls of functions.</a:t>
+            </a:r>
+          </a:p>
+          <a:p>
+            <a:pPr indent="-228600" lvl="0" marL="457200" rtl="0">
+              <a:spcBef>
+                <a:spcPts val="0"/>
+              </a:spcBef>
+              <a:buAutoNum type="arabicPeriod"/>
+            </a:pPr>
+            <a:r>
+              <a:rPr lang="en"/>
+              <a:t>Output handler which shows on the screen how output is coming.</a:t>
+            </a:r>
+          </a:p>
+        </p:txBody>
+      </p:sp>
+    </p:spTree>
+  </p:cSld>
+  <p:clrMapOvr>
+    <a:masterClrMapping/>
+  </p:clrMapOvr>
+</p:notes>
+</file>
+
+<file path=ppt/notesSlides/notesSlide14.xml><?xml version="1.0" encoding="utf-8"?>
+<p:notes xmlns:a="http://schemas.openxmlformats.org/drawingml/2006/main" xmlns:r="http://schemas.openxmlformats.org/officeDocument/2006/relationships" xmlns:mc="http://schemas.openxmlformats.org/markup-compatibility/2006" xmlns:mv="urn:schemas-microsoft-com:mac:vml" xmlns:p="http://schemas.openxmlformats.org/presentationml/2006/main" xmlns:c="http://schemas.openxmlformats.org/drawingml/2006/chart" xmlns:dgm="http://schemas.openxmlformats.org/drawingml/2006/diagram" xmlns:o="urn:schemas-microsoft-com:office:office" xmlns:v="urn:schemas-microsoft-com:vml" xmlns:pvml="urn:schemas-microsoft-com:office:powerpoint" xmlns:com="http://schemas.openxmlformats.org/drawingml/2006/compatibility" xmlns:p14="http://schemas.microsoft.com/office/powerpoint/2010/main" showMasterPhAnim="0" showMasterSp="0">
+  <p:cSld>
+    <p:spTree>
+      <p:nvGrpSpPr>
+        <p:cNvPr id="162" name="Shape 162"/>
+        <p:cNvGrpSpPr/>
+        <p:nvPr/>
+      </p:nvGrpSpPr>
+      <p:grpSpPr>
+        <a:xfrm>
+          <a:off x="0" y="0"/>
+          <a:ext cx="0" cy="0"/>
+          <a:chOff x="0" y="0"/>
+          <a:chExt cx="0" cy="0"/>
+        </a:xfrm>
+      </p:grpSpPr>
+      <p:sp>
+        <p:nvSpPr>
+          <p:cNvPr id="163" name="Shape 163"/>
+          <p:cNvSpPr/>
+          <p:nvPr>
+            <p:ph idx="2" type="sldImg"/>
+          </p:nvPr>
+        </p:nvSpPr>
+        <p:spPr>
+          <a:xfrm>
+            <a:off x="381300" y="685800"/>
+            <a:ext cx="6096000" cy="3429000"/>
+          </a:xfrm>
+          <a:custGeom>
+            <a:pathLst>
+              <a:path extrusionOk="0" h="120000" w="120000">
+                <a:moveTo>
+                  <a:pt x="0" y="0"/>
+                </a:moveTo>
+                <a:lnTo>
+                  <a:pt x="120000" y="0"/>
+                </a:lnTo>
+                <a:lnTo>
+                  <a:pt x="120000" y="120000"/>
+                </a:lnTo>
+                <a:lnTo>
+                  <a:pt x="0" y="120000"/>
+                </a:lnTo>
+                <a:close/>
+              </a:path>
+            </a:pathLst>
+          </a:custGeom>
+        </p:spPr>
+      </p:sp>
+      <p:sp>
+        <p:nvSpPr>
+          <p:cNvPr id="164" name="Shape 164"/>
+          <p:cNvSpPr txBox="1"/>
+          <p:nvPr>
+            <p:ph idx="1" type="body"/>
+          </p:nvPr>
+        </p:nvSpPr>
+        <p:spPr>
+          <a:xfrm>
+            <a:off x="685800" y="4343400"/>
+            <a:ext cx="5486400" cy="4114800"/>
+          </a:xfrm>
+          <a:prstGeom prst="rect">
+            <a:avLst/>
+          </a:prstGeom>
+        </p:spPr>
+        <p:txBody>
+          <a:bodyPr anchorCtr="0" anchor="t" bIns="91425" lIns="91425" rIns="91425" tIns="91425">
+            <a:noAutofit/>
+          </a:bodyPr>
+          <a:lstStyle/>
+          <a:p>
+            <a:pPr indent="-228600" lvl="0" marL="457200" rtl="0">
+              <a:spcBef>
+                <a:spcPts val="0"/>
+              </a:spcBef>
+              <a:buAutoNum type="arabicPeriod"/>
+            </a:pPr>
+            <a:r>
+              <a:rPr lang="en"/>
+              <a:t>We will be using trap and interrupt handlers for any inconve</a:t>
+            </a:r>
+          </a:p>
+          <a:p>
+            <a:pPr indent="-228600" lvl="0" marL="457200" rtl="0">
+              <a:spcBef>
+                <a:spcPts val="0"/>
+              </a:spcBef>
+              <a:buAutoNum type="arabicPeriod"/>
+            </a:pPr>
+            <a:r>
+              <a:rPr lang="en"/>
+              <a:t>nience of errors or multiple calls of functions.</a:t>
+            </a:r>
+          </a:p>
+          <a:p>
+            <a:pPr indent="-228600" lvl="0" marL="457200" rtl="0">
+              <a:spcBef>
+                <a:spcPts val="0"/>
+              </a:spcBef>
+              <a:buAutoNum type="arabicPeriod"/>
+            </a:pPr>
+            <a:r>
+              <a:rPr lang="en"/>
+              <a:t>Output handler which shows on the screen how output is coming.</a:t>
+            </a:r>
+          </a:p>
+        </p:txBody>
+      </p:sp>
+    </p:spTree>
+  </p:cSld>
+  <p:clrMapOvr>
+    <a:masterClrMapping/>
+  </p:clrMapOvr>
+</p:notes>
+</file>
+
+<file path=ppt/notesSlides/notesSlide15.xml><?xml version="1.0" encoding="utf-8"?>
+<p:notes xmlns:a="http://schemas.openxmlformats.org/drawingml/2006/main" xmlns:r="http://schemas.openxmlformats.org/officeDocument/2006/relationships" xmlns:mc="http://schemas.openxmlformats.org/markup-compatibility/2006" xmlns:mv="urn:schemas-microsoft-com:mac:vml" xmlns:p="http://schemas.openxmlformats.org/presentationml/2006/main" xmlns:c="http://schemas.openxmlformats.org/drawingml/2006/chart" xmlns:dgm="http://schemas.openxmlformats.org/drawingml/2006/diagram" xmlns:o="urn:schemas-microsoft-com:office:office" xmlns:v="urn:schemas-microsoft-com:vml" xmlns:pvml="urn:schemas-microsoft-com:office:powerpoint" xmlns:com="http://schemas.openxmlformats.org/drawingml/2006/compatibility" xmlns:p14="http://schemas.microsoft.com/office/powerpoint/2010/main" showMasterPhAnim="0" showMasterSp="0">
+  <p:cSld>
+    <p:spTree>
+      <p:nvGrpSpPr>
+        <p:cNvPr id="168" name="Shape 168"/>
+        <p:cNvGrpSpPr/>
+        <p:nvPr/>
+      </p:nvGrpSpPr>
+      <p:grpSpPr>
+        <a:xfrm>
+          <a:off x="0" y="0"/>
+          <a:ext cx="0" cy="0"/>
+          <a:chOff x="0" y="0"/>
+          <a:chExt cx="0" cy="0"/>
+        </a:xfrm>
+      </p:grpSpPr>
+      <p:sp>
+        <p:nvSpPr>
+          <p:cNvPr id="169" name="Shape 169"/>
+          <p:cNvSpPr/>
+          <p:nvPr>
+            <p:ph idx="2" type="sldImg"/>
+          </p:nvPr>
+        </p:nvSpPr>
+        <p:spPr>
+          <a:xfrm>
+            <a:off x="381300" y="685800"/>
+            <a:ext cx="6096000" cy="3429000"/>
+          </a:xfrm>
+          <a:custGeom>
+            <a:pathLst>
+              <a:path extrusionOk="0" h="120000" w="120000">
+                <a:moveTo>
+                  <a:pt x="0" y="0"/>
+                </a:moveTo>
+                <a:lnTo>
+                  <a:pt x="120000" y="0"/>
+                </a:lnTo>
+                <a:lnTo>
+                  <a:pt x="120000" y="120000"/>
+                </a:lnTo>
+                <a:lnTo>
+                  <a:pt x="0" y="120000"/>
+                </a:lnTo>
+                <a:close/>
+              </a:path>
+            </a:pathLst>
+          </a:custGeom>
+        </p:spPr>
+      </p:sp>
+      <p:sp>
+        <p:nvSpPr>
+          <p:cNvPr id="170" name="Shape 170"/>
+          <p:cNvSpPr txBox="1"/>
+          <p:nvPr>
+            <p:ph idx="1" type="body"/>
+          </p:nvPr>
+        </p:nvSpPr>
+        <p:spPr>
+          <a:xfrm>
+            <a:off x="685800" y="4343400"/>
+            <a:ext cx="5486400" cy="4114800"/>
+          </a:xfrm>
+          <a:prstGeom prst="rect">
+            <a:avLst/>
+          </a:prstGeom>
+        </p:spPr>
+        <p:txBody>
+          <a:bodyPr anchorCtr="0" anchor="t" bIns="91425" lIns="91425" rIns="91425" tIns="91425">
+            <a:noAutofit/>
+          </a:bodyPr>
+          <a:lstStyle/>
+          <a:p>
+            <a:pPr indent="-228600" lvl="0" marL="457200" rtl="0">
+              <a:spcBef>
+                <a:spcPts val="0"/>
+              </a:spcBef>
+              <a:buAutoNum type="arabicPeriod"/>
+            </a:pPr>
+            <a:r>
+              <a:rPr lang="en"/>
+              <a:t>We will be using trap and interrupt handlers for any inconve</a:t>
+            </a:r>
+          </a:p>
+          <a:p>
+            <a:pPr indent="-228600" lvl="0" marL="457200" rtl="0">
+              <a:spcBef>
+                <a:spcPts val="0"/>
+              </a:spcBef>
+              <a:buAutoNum type="arabicPeriod"/>
+            </a:pPr>
+            <a:r>
+              <a:rPr lang="en"/>
+              <a:t>nience of errors or multiple calls of functions.</a:t>
+            </a:r>
+          </a:p>
+          <a:p>
+            <a:pPr indent="-228600" lvl="0" marL="457200" rtl="0">
+              <a:spcBef>
+                <a:spcPts val="0"/>
+              </a:spcBef>
+              <a:buAutoNum type="arabicPeriod"/>
+            </a:pPr>
+            <a:r>
+              <a:rPr lang="en"/>
+              <a:t>Output handler which shows on the screen how output is coming.</a:t>
+            </a:r>
+          </a:p>
+        </p:txBody>
+      </p:sp>
+    </p:spTree>
+  </p:cSld>
+  <p:clrMapOvr>
+    <a:masterClrMapping/>
+  </p:clrMapOvr>
+</p:notes>
+</file>
+
+<file path=ppt/notesSlides/notesSlide16.xml><?xml version="1.0" encoding="utf-8"?>
+<p:notes xmlns:a="http://schemas.openxmlformats.org/drawingml/2006/main" xmlns:r="http://schemas.openxmlformats.org/officeDocument/2006/relationships" xmlns:mc="http://schemas.openxmlformats.org/markup-compatibility/2006" xmlns:mv="urn:schemas-microsoft-com:mac:vml" xmlns:p="http://schemas.openxmlformats.org/presentationml/2006/main" xmlns:c="http://schemas.openxmlformats.org/drawingml/2006/chart" xmlns:dgm="http://schemas.openxmlformats.org/drawingml/2006/diagram" xmlns:o="urn:schemas-microsoft-com:office:office" xmlns:v="urn:schemas-microsoft-com:vml" xmlns:pvml="urn:schemas-microsoft-com:office:powerpoint" xmlns:com="http://schemas.openxmlformats.org/drawingml/2006/compatibility" xmlns:p14="http://schemas.microsoft.com/office/powerpoint/2010/main" showMasterPhAnim="0" showMasterSp="0">
+  <p:cSld>
+    <p:spTree>
+      <p:nvGrpSpPr>
+        <p:cNvPr id="174" name="Shape 174"/>
+        <p:cNvGrpSpPr/>
+        <p:nvPr/>
+      </p:nvGrpSpPr>
+      <p:grpSpPr>
+        <a:xfrm>
+          <a:off x="0" y="0"/>
+          <a:ext cx="0" cy="0"/>
+          <a:chOff x="0" y="0"/>
+          <a:chExt cx="0" cy="0"/>
+        </a:xfrm>
+      </p:grpSpPr>
+      <p:sp>
+        <p:nvSpPr>
+          <p:cNvPr id="175" name="Shape 175"/>
+          <p:cNvSpPr/>
+          <p:nvPr>
+            <p:ph idx="2" type="sldImg"/>
+          </p:nvPr>
+        </p:nvSpPr>
+        <p:spPr>
+          <a:xfrm>
+            <a:off x="381300" y="685800"/>
+            <a:ext cx="6096000" cy="3429000"/>
+          </a:xfrm>
+          <a:custGeom>
+            <a:pathLst>
+              <a:path extrusionOk="0" h="120000" w="120000">
+                <a:moveTo>
+                  <a:pt x="0" y="0"/>
+                </a:moveTo>
+                <a:lnTo>
+                  <a:pt x="120000" y="0"/>
+                </a:lnTo>
+                <a:lnTo>
+                  <a:pt x="120000" y="120000"/>
+                </a:lnTo>
+                <a:lnTo>
+                  <a:pt x="0" y="120000"/>
+                </a:lnTo>
+                <a:close/>
+              </a:path>
+            </a:pathLst>
+          </a:custGeom>
+        </p:spPr>
+      </p:sp>
+      <p:sp>
+        <p:nvSpPr>
+          <p:cNvPr id="176" name="Shape 176"/>
+          <p:cNvSpPr txBox="1"/>
+          <p:nvPr>
+            <p:ph idx="1" type="body"/>
+          </p:nvPr>
+        </p:nvSpPr>
+        <p:spPr>
+          <a:xfrm>
+            <a:off x="685800" y="4343400"/>
+            <a:ext cx="5486400" cy="4114800"/>
+          </a:xfrm>
+          <a:prstGeom prst="rect">
+            <a:avLst/>
+          </a:prstGeom>
+        </p:spPr>
+        <p:txBody>
+          <a:bodyPr anchorCtr="0" anchor="t" bIns="91425" lIns="91425" rIns="91425" tIns="91425">
+            <a:noAutofit/>
+          </a:bodyPr>
+          <a:lstStyle/>
+          <a:p>
+            <a:pPr indent="-228600" lvl="0" marL="457200" rtl="0">
+              <a:spcBef>
+                <a:spcPts val="0"/>
+              </a:spcBef>
+              <a:buAutoNum type="arabicPeriod"/>
+            </a:pPr>
+            <a:r>
+              <a:rPr lang="en"/>
+              <a:t>We will be using trap and interrupt handlers for any inconve</a:t>
+            </a:r>
+          </a:p>
+          <a:p>
+            <a:pPr indent="-228600" lvl="0" marL="457200" rtl="0">
+              <a:spcBef>
+                <a:spcPts val="0"/>
+              </a:spcBef>
+              <a:buAutoNum type="arabicPeriod"/>
+            </a:pPr>
+            <a:r>
+              <a:rPr lang="en"/>
+              <a:t>nience of errors or multiple calls of functions.</a:t>
+            </a:r>
+          </a:p>
+          <a:p>
+            <a:pPr indent="-228600" lvl="0" marL="457200" rtl="0">
+              <a:spcBef>
+                <a:spcPts val="0"/>
+              </a:spcBef>
+              <a:buAutoNum type="arabicPeriod"/>
+            </a:pPr>
+            <a:r>
+              <a:rPr lang="en"/>
+              <a:t>Output handler which shows on the screen how output is coming.</a:t>
+            </a:r>
+          </a:p>
+        </p:txBody>
+      </p:sp>
+    </p:spTree>
+  </p:cSld>
+  <p:clrMapOvr>
+    <a:masterClrMapping/>
+  </p:clrMapOvr>
+</p:notes>
+</file>
+
+<file path=ppt/notesSlides/notesSlide17.xml><?xml version="1.0" encoding="utf-8"?>
+<p:notes xmlns:a="http://schemas.openxmlformats.org/drawingml/2006/main" xmlns:r="http://schemas.openxmlformats.org/officeDocument/2006/relationships" xmlns:mc="http://schemas.openxmlformats.org/markup-compatibility/2006" xmlns:mv="urn:schemas-microsoft-com:mac:vml" xmlns:p="http://schemas.openxmlformats.org/presentationml/2006/main" xmlns:c="http://schemas.openxmlformats.org/drawingml/2006/chart" xmlns:dgm="http://schemas.openxmlformats.org/drawingml/2006/diagram" xmlns:o="urn:schemas-microsoft-com:office:office" xmlns:v="urn:schemas-microsoft-com:vml" xmlns:pvml="urn:schemas-microsoft-com:office:powerpoint" xmlns:com="http://schemas.openxmlformats.org/drawingml/2006/compatibility" xmlns:p14="http://schemas.microsoft.com/office/powerpoint/2010/main" showMasterPhAnim="0" showMasterSp="0">
+  <p:cSld>
+    <p:spTree>
+      <p:nvGrpSpPr>
+        <p:cNvPr id="180" name="Shape 180"/>
+        <p:cNvGrpSpPr/>
+        <p:nvPr/>
+      </p:nvGrpSpPr>
+      <p:grpSpPr>
+        <a:xfrm>
+          <a:off x="0" y="0"/>
+          <a:ext cx="0" cy="0"/>
+          <a:chOff x="0" y="0"/>
+          <a:chExt cx="0" cy="0"/>
+        </a:xfrm>
+      </p:grpSpPr>
+      <p:sp>
+        <p:nvSpPr>
+          <p:cNvPr id="181" name="Shape 181"/>
+          <p:cNvSpPr/>
+          <p:nvPr>
+            <p:ph idx="2" type="sldImg"/>
+          </p:nvPr>
+        </p:nvSpPr>
+        <p:spPr>
+          <a:xfrm>
+            <a:off x="381300" y="685800"/>
+            <a:ext cx="6096000" cy="3429000"/>
+          </a:xfrm>
+          <a:custGeom>
+            <a:pathLst>
+              <a:path extrusionOk="0" h="120000" w="120000">
+                <a:moveTo>
+                  <a:pt x="0" y="0"/>
+                </a:moveTo>
+                <a:lnTo>
+                  <a:pt x="120000" y="0"/>
+                </a:lnTo>
+                <a:lnTo>
+                  <a:pt x="120000" y="120000"/>
+                </a:lnTo>
+                <a:lnTo>
+                  <a:pt x="0" y="120000"/>
+                </a:lnTo>
+                <a:close/>
+              </a:path>
+            </a:pathLst>
+          </a:custGeom>
+        </p:spPr>
+      </p:sp>
+      <p:sp>
+        <p:nvSpPr>
+          <p:cNvPr id="182" name="Shape 182"/>
+          <p:cNvSpPr txBox="1"/>
+          <p:nvPr>
+            <p:ph idx="1" type="body"/>
+          </p:nvPr>
+        </p:nvSpPr>
+        <p:spPr>
+          <a:xfrm>
+            <a:off x="685800" y="4343400"/>
+            <a:ext cx="5486400" cy="4114800"/>
+          </a:xfrm>
+          <a:prstGeom prst="rect">
+            <a:avLst/>
+          </a:prstGeom>
+        </p:spPr>
+        <p:txBody>
+          <a:bodyPr anchorCtr="0" anchor="t" bIns="91425" lIns="91425" rIns="91425" tIns="91425">
+            <a:noAutofit/>
+          </a:bodyPr>
+          <a:lstStyle/>
+          <a:p>
+            <a:pPr indent="-228600" lvl="0" marL="457200" rtl="0">
+              <a:spcBef>
+                <a:spcPts val="0"/>
+              </a:spcBef>
+              <a:buAutoNum type="arabicPeriod"/>
+            </a:pPr>
+            <a:r>
+              <a:rPr lang="en"/>
+              <a:t>We will be using trap and interrupt handlers for any inconve</a:t>
+            </a:r>
+          </a:p>
+          <a:p>
+            <a:pPr indent="-228600" lvl="0" marL="457200" rtl="0">
+              <a:spcBef>
+                <a:spcPts val="0"/>
+              </a:spcBef>
+              <a:buAutoNum type="arabicPeriod"/>
+            </a:pPr>
+            <a:r>
+              <a:rPr lang="en"/>
+              <a:t>nience of errors or multiple calls of functions.</a:t>
+            </a:r>
+          </a:p>
+          <a:p>
+            <a:pPr indent="-228600" lvl="0" marL="457200" rtl="0">
+              <a:spcBef>
+                <a:spcPts val="0"/>
+              </a:spcBef>
+              <a:buAutoNum type="arabicPeriod"/>
+            </a:pPr>
+            <a:r>
+              <a:rPr lang="en"/>
+              <a:t>Output handler which shows on the screen how output is coming.</a:t>
+            </a:r>
+          </a:p>
+        </p:txBody>
+      </p:sp>
+    </p:spTree>
+  </p:cSld>
+  <p:clrMapOvr>
+    <a:masterClrMapping/>
+  </p:clrMapOvr>
+</p:notes>
+</file>
+
+<file path=ppt/notesSlides/notesSlide18.xml><?xml version="1.0" encoding="utf-8"?>
+<p:notes xmlns:a="http://schemas.openxmlformats.org/drawingml/2006/main" xmlns:r="http://schemas.openxmlformats.org/officeDocument/2006/relationships" xmlns:mc="http://schemas.openxmlformats.org/markup-compatibility/2006" xmlns:mv="urn:schemas-microsoft-com:mac:vml" xmlns:p="http://schemas.openxmlformats.org/presentationml/2006/main" xmlns:c="http://schemas.openxmlformats.org/drawingml/2006/chart" xmlns:dgm="http://schemas.openxmlformats.org/drawingml/2006/diagram" xmlns:o="urn:schemas-microsoft-com:office:office" xmlns:v="urn:schemas-microsoft-com:vml" xmlns:pvml="urn:schemas-microsoft-com:office:powerpoint" xmlns:com="http://schemas.openxmlformats.org/drawingml/2006/compatibility" xmlns:p14="http://schemas.microsoft.com/office/powerpoint/2010/main" showMasterPhAnim="0" showMasterSp="0">
+  <p:cSld>
+    <p:spTree>
+      <p:nvGrpSpPr>
+        <p:cNvPr id="186" name="Shape 186"/>
+        <p:cNvGrpSpPr/>
+        <p:nvPr/>
+      </p:nvGrpSpPr>
+      <p:grpSpPr>
+        <a:xfrm>
+          <a:off x="0" y="0"/>
+          <a:ext cx="0" cy="0"/>
+          <a:chOff x="0" y="0"/>
+          <a:chExt cx="0" cy="0"/>
+        </a:xfrm>
+      </p:grpSpPr>
+      <p:sp>
+        <p:nvSpPr>
+          <p:cNvPr id="187" name="Shape 187"/>
+          <p:cNvSpPr/>
+          <p:nvPr>
+            <p:ph idx="2" type="sldImg"/>
+          </p:nvPr>
+        </p:nvSpPr>
+        <p:spPr>
+          <a:xfrm>
+            <a:off x="381300" y="685800"/>
+            <a:ext cx="6096000" cy="3429000"/>
+          </a:xfrm>
+          <a:custGeom>
+            <a:pathLst>
+              <a:path extrusionOk="0" h="120000" w="120000">
+                <a:moveTo>
+                  <a:pt x="0" y="0"/>
+                </a:moveTo>
+                <a:lnTo>
+                  <a:pt x="120000" y="0"/>
+                </a:lnTo>
+                <a:lnTo>
+                  <a:pt x="120000" y="120000"/>
+                </a:lnTo>
+                <a:lnTo>
+                  <a:pt x="0" y="120000"/>
+                </a:lnTo>
+                <a:close/>
+              </a:path>
+            </a:pathLst>
+          </a:custGeom>
+        </p:spPr>
+      </p:sp>
+      <p:sp>
+        <p:nvSpPr>
+          <p:cNvPr id="188" name="Shape 188"/>
+          <p:cNvSpPr txBox="1"/>
+          <p:nvPr>
+            <p:ph idx="1" type="body"/>
+          </p:nvPr>
+        </p:nvSpPr>
+        <p:spPr>
+          <a:xfrm>
+            <a:off x="685800" y="4343400"/>
+            <a:ext cx="5486400" cy="4114800"/>
+          </a:xfrm>
+          <a:prstGeom prst="rect">
+            <a:avLst/>
+          </a:prstGeom>
+        </p:spPr>
+        <p:txBody>
+          <a:bodyPr anchorCtr="0" anchor="t" bIns="91425" lIns="91425" rIns="91425" tIns="91425">
+            <a:noAutofit/>
+          </a:bodyPr>
+          <a:lstStyle/>
+          <a:p>
+            <a:pPr lvl="0">
+              <a:spcBef>
+                <a:spcPts val="0"/>
+              </a:spcBef>
+              <a:buNone/>
+            </a:pPr>
+            <a:r>
+              <a:t/>
+            </a:r>
+            <a:endParaRPr/>
+          </a:p>
+        </p:txBody>
+      </p:sp>
+    </p:spTree>
+  </p:cSld>
+  <p:clrMapOvr>
+    <a:masterClrMapping/>
+  </p:clrMapOvr>
+</p:notes>
+</file>
+
+<file path=ppt/notesSlides/notesSlide19.xml><?xml version="1.0" encoding="utf-8"?>
+<p:notes xmlns:a="http://schemas.openxmlformats.org/drawingml/2006/main" xmlns:r="http://schemas.openxmlformats.org/officeDocument/2006/relationships" xmlns:mc="http://schemas.openxmlformats.org/markup-compatibility/2006" xmlns:mv="urn:schemas-microsoft-com:mac:vml" xmlns:p="http://schemas.openxmlformats.org/presentationml/2006/main" xmlns:c="http://schemas.openxmlformats.org/drawingml/2006/chart" xmlns:dgm="http://schemas.openxmlformats.org/drawingml/2006/diagram" xmlns:o="urn:schemas-microsoft-com:office:office" xmlns:v="urn:schemas-microsoft-com:vml" xmlns:pvml="urn:schemas-microsoft-com:office:powerpoint" xmlns:com="http://schemas.openxmlformats.org/drawingml/2006/compatibility" xmlns:p14="http://schemas.microsoft.com/office/powerpoint/2010/main" showMasterPhAnim="0" showMasterSp="0">
+  <p:cSld>
+    <p:spTree>
+      <p:nvGrpSpPr>
+        <p:cNvPr id="192" name="Shape 192"/>
+        <p:cNvGrpSpPr/>
+        <p:nvPr/>
+      </p:nvGrpSpPr>
+      <p:grpSpPr>
+        <a:xfrm>
+          <a:off x="0" y="0"/>
+          <a:ext cx="0" cy="0"/>
+          <a:chOff x="0" y="0"/>
+          <a:chExt cx="0" cy="0"/>
+        </a:xfrm>
+      </p:grpSpPr>
+      <p:sp>
+        <p:nvSpPr>
+          <p:cNvPr id="193" name="Shape 193"/>
+          <p:cNvSpPr/>
+          <p:nvPr>
+            <p:ph idx="2" type="sldImg"/>
+          </p:nvPr>
+        </p:nvSpPr>
+        <p:spPr>
+          <a:xfrm>
+            <a:off x="381300" y="685800"/>
+            <a:ext cx="6096000" cy="3429000"/>
+          </a:xfrm>
+          <a:custGeom>
+            <a:pathLst>
+              <a:path extrusionOk="0" h="120000" w="120000">
+                <a:moveTo>
+                  <a:pt x="0" y="0"/>
+                </a:moveTo>
+                <a:lnTo>
+                  <a:pt x="120000" y="0"/>
+                </a:lnTo>
+                <a:lnTo>
+                  <a:pt x="120000" y="120000"/>
+                </a:lnTo>
+                <a:lnTo>
+                  <a:pt x="0" y="120000"/>
+                </a:lnTo>
+                <a:close/>
+              </a:path>
+            </a:pathLst>
+          </a:custGeom>
+        </p:spPr>
+      </p:sp>
+      <p:sp>
+        <p:nvSpPr>
+          <p:cNvPr id="194" name="Shape 194"/>
+          <p:cNvSpPr txBox="1"/>
+          <p:nvPr>
+            <p:ph idx="1" type="body"/>
+          </p:nvPr>
+        </p:nvSpPr>
+        <p:spPr>
+          <a:xfrm>
+            <a:off x="685800" y="4343400"/>
+            <a:ext cx="5486400" cy="4114800"/>
+          </a:xfrm>
+          <a:prstGeom prst="rect">
+            <a:avLst/>
+          </a:prstGeom>
+        </p:spPr>
+        <p:txBody>
+          <a:bodyPr anchorCtr="0" anchor="t" bIns="91425" lIns="91425" rIns="91425" tIns="91425">
+            <a:noAutofit/>
+          </a:bodyPr>
+          <a:lstStyle/>
+          <a:p>
             <a:pPr lvl="0">
               <a:spcBef>
                 <a:spcPts val="0"/>
@@ -870,6 +1688,196 @@
       <p:sp>
         <p:nvSpPr>
           <p:cNvPr id="61" name="Shape 61"/>
+          <p:cNvSpPr txBox="1"/>
+          <p:nvPr>
+            <p:ph idx="1" type="body"/>
+          </p:nvPr>
+        </p:nvSpPr>
+        <p:spPr>
+          <a:xfrm>
+            <a:off x="685800" y="4343400"/>
+            <a:ext cx="5486400" cy="4114800"/>
+          </a:xfrm>
+          <a:prstGeom prst="rect">
+            <a:avLst/>
+          </a:prstGeom>
+        </p:spPr>
+        <p:txBody>
+          <a:bodyPr anchorCtr="0" anchor="t" bIns="91425" lIns="91425" rIns="91425" tIns="91425">
+            <a:noAutofit/>
+          </a:bodyPr>
+          <a:lstStyle/>
+          <a:p>
+            <a:pPr lvl="0">
+              <a:spcBef>
+                <a:spcPts val="0"/>
+              </a:spcBef>
+              <a:buNone/>
+            </a:pPr>
+            <a:r>
+              <a:t/>
+            </a:r>
+            <a:endParaRPr/>
+          </a:p>
+        </p:txBody>
+      </p:sp>
+    </p:spTree>
+  </p:cSld>
+  <p:clrMapOvr>
+    <a:masterClrMapping/>
+  </p:clrMapOvr>
+</p:notes>
+</file>
+
+<file path=ppt/notesSlides/notesSlide20.xml><?xml version="1.0" encoding="utf-8"?>
+<p:notes xmlns:a="http://schemas.openxmlformats.org/drawingml/2006/main" xmlns:r="http://schemas.openxmlformats.org/officeDocument/2006/relationships" xmlns:mc="http://schemas.openxmlformats.org/markup-compatibility/2006" xmlns:mv="urn:schemas-microsoft-com:mac:vml" xmlns:p="http://schemas.openxmlformats.org/presentationml/2006/main" xmlns:c="http://schemas.openxmlformats.org/drawingml/2006/chart" xmlns:dgm="http://schemas.openxmlformats.org/drawingml/2006/diagram" xmlns:o="urn:schemas-microsoft-com:office:office" xmlns:v="urn:schemas-microsoft-com:vml" xmlns:pvml="urn:schemas-microsoft-com:office:powerpoint" xmlns:com="http://schemas.openxmlformats.org/drawingml/2006/compatibility" xmlns:p14="http://schemas.microsoft.com/office/powerpoint/2010/main" showMasterPhAnim="0" showMasterSp="0">
+  <p:cSld>
+    <p:spTree>
+      <p:nvGrpSpPr>
+        <p:cNvPr id="198" name="Shape 198"/>
+        <p:cNvGrpSpPr/>
+        <p:nvPr/>
+      </p:nvGrpSpPr>
+      <p:grpSpPr>
+        <a:xfrm>
+          <a:off x="0" y="0"/>
+          <a:ext cx="0" cy="0"/>
+          <a:chOff x="0" y="0"/>
+          <a:chExt cx="0" cy="0"/>
+        </a:xfrm>
+      </p:grpSpPr>
+      <p:sp>
+        <p:nvSpPr>
+          <p:cNvPr id="199" name="Shape 199"/>
+          <p:cNvSpPr/>
+          <p:nvPr>
+            <p:ph idx="2" type="sldImg"/>
+          </p:nvPr>
+        </p:nvSpPr>
+        <p:spPr>
+          <a:xfrm>
+            <a:off x="381300" y="685800"/>
+            <a:ext cx="6096000" cy="3429000"/>
+          </a:xfrm>
+          <a:custGeom>
+            <a:pathLst>
+              <a:path extrusionOk="0" h="120000" w="120000">
+                <a:moveTo>
+                  <a:pt x="0" y="0"/>
+                </a:moveTo>
+                <a:lnTo>
+                  <a:pt x="120000" y="0"/>
+                </a:lnTo>
+                <a:lnTo>
+                  <a:pt x="120000" y="120000"/>
+                </a:lnTo>
+                <a:lnTo>
+                  <a:pt x="0" y="120000"/>
+                </a:lnTo>
+                <a:close/>
+              </a:path>
+            </a:pathLst>
+          </a:custGeom>
+        </p:spPr>
+      </p:sp>
+      <p:sp>
+        <p:nvSpPr>
+          <p:cNvPr id="200" name="Shape 200"/>
+          <p:cNvSpPr txBox="1"/>
+          <p:nvPr>
+            <p:ph idx="1" type="body"/>
+          </p:nvPr>
+        </p:nvSpPr>
+        <p:spPr>
+          <a:xfrm>
+            <a:off x="685800" y="4343400"/>
+            <a:ext cx="5486400" cy="4114800"/>
+          </a:xfrm>
+          <a:prstGeom prst="rect">
+            <a:avLst/>
+          </a:prstGeom>
+        </p:spPr>
+        <p:txBody>
+          <a:bodyPr anchorCtr="0" anchor="t" bIns="91425" lIns="91425" rIns="91425" tIns="91425">
+            <a:noAutofit/>
+          </a:bodyPr>
+          <a:lstStyle/>
+          <a:p>
+            <a:pPr lvl="0">
+              <a:spcBef>
+                <a:spcPts val="0"/>
+              </a:spcBef>
+              <a:buNone/>
+            </a:pPr>
+            <a:r>
+              <a:t/>
+            </a:r>
+            <a:endParaRPr/>
+          </a:p>
+        </p:txBody>
+      </p:sp>
+    </p:spTree>
+  </p:cSld>
+  <p:clrMapOvr>
+    <a:masterClrMapping/>
+  </p:clrMapOvr>
+</p:notes>
+</file>
+
+<file path=ppt/notesSlides/notesSlide21.xml><?xml version="1.0" encoding="utf-8"?>
+<p:notes xmlns:a="http://schemas.openxmlformats.org/drawingml/2006/main" xmlns:r="http://schemas.openxmlformats.org/officeDocument/2006/relationships" xmlns:mc="http://schemas.openxmlformats.org/markup-compatibility/2006" xmlns:mv="urn:schemas-microsoft-com:mac:vml" xmlns:p="http://schemas.openxmlformats.org/presentationml/2006/main" xmlns:c="http://schemas.openxmlformats.org/drawingml/2006/chart" xmlns:dgm="http://schemas.openxmlformats.org/drawingml/2006/diagram" xmlns:o="urn:schemas-microsoft-com:office:office" xmlns:v="urn:schemas-microsoft-com:vml" xmlns:pvml="urn:schemas-microsoft-com:office:powerpoint" xmlns:com="http://schemas.openxmlformats.org/drawingml/2006/compatibility" xmlns:p14="http://schemas.microsoft.com/office/powerpoint/2010/main" showMasterPhAnim="0" showMasterSp="0">
+  <p:cSld>
+    <p:spTree>
+      <p:nvGrpSpPr>
+        <p:cNvPr id="205" name="Shape 205"/>
+        <p:cNvGrpSpPr/>
+        <p:nvPr/>
+      </p:nvGrpSpPr>
+      <p:grpSpPr>
+        <a:xfrm>
+          <a:off x="0" y="0"/>
+          <a:ext cx="0" cy="0"/>
+          <a:chOff x="0" y="0"/>
+          <a:chExt cx="0" cy="0"/>
+        </a:xfrm>
+      </p:grpSpPr>
+      <p:sp>
+        <p:nvSpPr>
+          <p:cNvPr id="206" name="Shape 206"/>
+          <p:cNvSpPr/>
+          <p:nvPr>
+            <p:ph idx="2" type="sldImg"/>
+          </p:nvPr>
+        </p:nvSpPr>
+        <p:spPr>
+          <a:xfrm>
+            <a:off x="381300" y="685800"/>
+            <a:ext cx="6096000" cy="3429000"/>
+          </a:xfrm>
+          <a:custGeom>
+            <a:pathLst>
+              <a:path extrusionOk="0" h="120000" w="120000">
+                <a:moveTo>
+                  <a:pt x="0" y="0"/>
+                </a:moveTo>
+                <a:lnTo>
+                  <a:pt x="120000" y="0"/>
+                </a:lnTo>
+                <a:lnTo>
+                  <a:pt x="120000" y="120000"/>
+                </a:lnTo>
+                <a:lnTo>
+                  <a:pt x="0" y="120000"/>
+                </a:lnTo>
+                <a:close/>
+              </a:path>
+            </a:pathLst>
+          </a:custGeom>
+        </p:spPr>
+      </p:sp>
+      <p:sp>
+        <p:nvSpPr>
+          <p:cNvPr id="207" name="Shape 207"/>
           <p:cNvSpPr txBox="1"/>
           <p:nvPr>
             <p:ph idx="1" type="body"/>
@@ -6042,8 +7050,8 @@
         </p:nvSpPr>
         <p:spPr>
           <a:xfrm>
-            <a:off x="1705800" y="1917300"/>
-            <a:ext cx="5732400" cy="1308900"/>
+            <a:off x="311700" y="292850"/>
+            <a:ext cx="3362100" cy="1466400"/>
           </a:xfrm>
           <a:prstGeom prst="rect">
             <a:avLst/>
@@ -6062,8 +7070,2711 @@
               <a:buNone/>
             </a:pPr>
             <a:r>
-              <a:rPr lang="en" sz="6000" u="sng"/>
-              <a:t>THANK YOU</a:t>
+              <a:rPr lang="en"/>
+              <a:t>dATA pATH</a:t>
+            </a:r>
+          </a:p>
+          <a:p>
+            <a:pPr lvl="0" rtl="0" algn="ctr">
+              <a:spcBef>
+                <a:spcPts val="0"/>
+              </a:spcBef>
+              <a:buNone/>
+            </a:pPr>
+            <a:r>
+              <a:rPr lang="en"/>
+              <a:t>(MULTI-BUS)</a:t>
+            </a:r>
+          </a:p>
+        </p:txBody>
+      </p:sp>
+      <p:pic>
+        <p:nvPicPr>
+          <p:cNvPr id="127" name="Shape 127"/>
+          <p:cNvPicPr preferRelativeResize="0"/>
+          <p:nvPr/>
+        </p:nvPicPr>
+        <p:blipFill>
+          <a:blip r:embed="rId3">
+            <a:alphaModFix/>
+          </a:blip>
+          <a:stretch>
+            <a:fillRect/>
+          </a:stretch>
+        </p:blipFill>
+        <p:spPr>
+          <a:xfrm>
+            <a:off x="3839475" y="33225"/>
+            <a:ext cx="2985299" cy="5143500"/>
+          </a:xfrm>
+          <a:prstGeom prst="rect">
+            <a:avLst/>
+          </a:prstGeom>
+          <a:noFill/>
+          <a:ln>
+            <a:noFill/>
+          </a:ln>
+        </p:spPr>
+      </p:pic>
+    </p:spTree>
+  </p:cSld>
+  <p:clrMapOvr>
+    <a:masterClrMapping/>
+  </p:clrMapOvr>
+</p:sld>
+</file>
+
+<file path=ppt/slides/slide13.xml><?xml version="1.0" encoding="utf-8"?>
+<p:sld xmlns:a="http://schemas.openxmlformats.org/drawingml/2006/main" xmlns:r="http://schemas.openxmlformats.org/officeDocument/2006/relationships" xmlns:mc="http://schemas.openxmlformats.org/markup-compatibility/2006" xmlns:mv="urn:schemas-microsoft-com:mac:vml" xmlns:p="http://schemas.openxmlformats.org/presentationml/2006/main" xmlns:c="http://schemas.openxmlformats.org/drawingml/2006/chart" xmlns:dgm="http://schemas.openxmlformats.org/drawingml/2006/diagram" xmlns:o="urn:schemas-microsoft-com:office:office" xmlns:v="urn:schemas-microsoft-com:vml" xmlns:pvml="urn:schemas-microsoft-com:office:powerpoint" xmlns:com="http://schemas.openxmlformats.org/drawingml/2006/compatibility" xmlns:p14="http://schemas.microsoft.com/office/powerpoint/2010/main">
+  <p:cSld>
+    <p:spTree>
+      <p:nvGrpSpPr>
+        <p:cNvPr id="131" name="Shape 131"/>
+        <p:cNvGrpSpPr/>
+        <p:nvPr/>
+      </p:nvGrpSpPr>
+      <p:grpSpPr>
+        <a:xfrm>
+          <a:off x="0" y="0"/>
+          <a:ext cx="0" cy="0"/>
+          <a:chOff x="0" y="0"/>
+          <a:chExt cx="0" cy="0"/>
+        </a:xfrm>
+      </p:grpSpPr>
+      <p:sp>
+        <p:nvSpPr>
+          <p:cNvPr id="132" name="Shape 132"/>
+          <p:cNvSpPr txBox="1"/>
+          <p:nvPr>
+            <p:ph type="title"/>
+          </p:nvPr>
+        </p:nvSpPr>
+        <p:spPr>
+          <a:xfrm>
+            <a:off x="311700" y="292850"/>
+            <a:ext cx="8520600" cy="801000"/>
+          </a:xfrm>
+          <a:prstGeom prst="rect">
+            <a:avLst/>
+          </a:prstGeom>
+        </p:spPr>
+        <p:txBody>
+          <a:bodyPr anchorCtr="0" anchor="t" bIns="91425" lIns="91425" rIns="91425" tIns="91425">
+            <a:noAutofit/>
+          </a:bodyPr>
+          <a:lstStyle/>
+          <a:p>
+            <a:pPr lvl="0" rtl="0">
+              <a:spcBef>
+                <a:spcPts val="0"/>
+              </a:spcBef>
+              <a:buNone/>
+            </a:pPr>
+            <a:r>
+              <a:rPr lang="en"/>
+              <a:t>ALU DESIGN</a:t>
+            </a:r>
+          </a:p>
+        </p:txBody>
+      </p:sp>
+      <p:sp>
+        <p:nvSpPr>
+          <p:cNvPr id="133" name="Shape 133"/>
+          <p:cNvSpPr/>
+          <p:nvPr/>
+        </p:nvSpPr>
+        <p:spPr>
+          <a:xfrm rot="-5400000">
+            <a:off x="4107218" y="1731478"/>
+            <a:ext cx="2163150" cy="1928800"/>
+          </a:xfrm>
+          <a:prstGeom prst="flowChartManualOperation">
+            <a:avLst/>
+          </a:prstGeom>
+          <a:solidFill>
+            <a:schemeClr val="lt2"/>
+          </a:solidFill>
+          <a:ln cap="flat" cmpd="sng" w="9525">
+            <a:solidFill>
+              <a:schemeClr val="dk2"/>
+            </a:solidFill>
+            <a:prstDash val="solid"/>
+            <a:round/>
+            <a:headEnd len="med" w="med" type="none"/>
+            <a:tailEnd len="med" w="med" type="none"/>
+          </a:ln>
+        </p:spPr>
+        <p:txBody>
+          <a:bodyPr anchorCtr="0" anchor="ctr" bIns="91425" lIns="91425" rIns="91425" tIns="91425">
+            <a:noAutofit/>
+          </a:bodyPr>
+          <a:lstStyle/>
+          <a:p>
+            <a:pPr lvl="0">
+              <a:spcBef>
+                <a:spcPts val="0"/>
+              </a:spcBef>
+              <a:buNone/>
+            </a:pPr>
+            <a:r>
+              <a:rPr lang="en" sz="1200"/>
+              <a:t>8</a:t>
+            </a:r>
+            <a:r>
+              <a:rPr lang="en" sz="1200"/>
+              <a:t>:1 MUX</a:t>
+            </a:r>
+          </a:p>
+        </p:txBody>
+      </p:sp>
+      <p:cxnSp>
+        <p:nvCxnSpPr>
+          <p:cNvPr id="134" name="Shape 134"/>
+          <p:cNvCxnSpPr>
+            <a:stCxn id="133" idx="2"/>
+          </p:cNvCxnSpPr>
+          <p:nvPr/>
+        </p:nvCxnSpPr>
+        <p:spPr>
+          <a:xfrm flipH="1" rot="10800000">
+            <a:off x="6153193" y="2681178"/>
+            <a:ext cx="941400" cy="14700"/>
+          </a:xfrm>
+          <a:prstGeom prst="straightConnector1">
+            <a:avLst/>
+          </a:prstGeom>
+          <a:noFill/>
+          <a:ln cap="flat" cmpd="sng" w="9525">
+            <a:solidFill>
+              <a:schemeClr val="dk2"/>
+            </a:solidFill>
+            <a:prstDash val="solid"/>
+            <a:round/>
+            <a:headEnd len="lg" w="lg" type="none"/>
+            <a:tailEnd len="lg" w="lg" type="none"/>
+          </a:ln>
+        </p:spPr>
+      </p:cxnSp>
+      <p:cxnSp>
+        <p:nvCxnSpPr>
+          <p:cNvPr id="135" name="Shape 135"/>
+          <p:cNvCxnSpPr/>
+          <p:nvPr/>
+        </p:nvCxnSpPr>
+        <p:spPr>
+          <a:xfrm>
+            <a:off x="3625150" y="1923350"/>
+            <a:ext cx="611700" cy="0"/>
+          </a:xfrm>
+          <a:prstGeom prst="straightConnector1">
+            <a:avLst/>
+          </a:prstGeom>
+          <a:noFill/>
+          <a:ln cap="flat" cmpd="sng" w="9525">
+            <a:solidFill>
+              <a:schemeClr val="dk2"/>
+            </a:solidFill>
+            <a:prstDash val="solid"/>
+            <a:round/>
+            <a:headEnd len="lg" w="lg" type="none"/>
+            <a:tailEnd len="lg" w="lg" type="none"/>
+          </a:ln>
+        </p:spPr>
+      </p:cxnSp>
+      <p:cxnSp>
+        <p:nvCxnSpPr>
+          <p:cNvPr id="136" name="Shape 136"/>
+          <p:cNvCxnSpPr/>
+          <p:nvPr/>
+        </p:nvCxnSpPr>
+        <p:spPr>
+          <a:xfrm>
+            <a:off x="3625150" y="2151950"/>
+            <a:ext cx="611700" cy="0"/>
+          </a:xfrm>
+          <a:prstGeom prst="straightConnector1">
+            <a:avLst/>
+          </a:prstGeom>
+          <a:noFill/>
+          <a:ln cap="flat" cmpd="sng" w="9525">
+            <a:solidFill>
+              <a:schemeClr val="dk2"/>
+            </a:solidFill>
+            <a:prstDash val="solid"/>
+            <a:round/>
+            <a:headEnd len="lg" w="lg" type="none"/>
+            <a:tailEnd len="lg" w="lg" type="none"/>
+          </a:ln>
+        </p:spPr>
+      </p:cxnSp>
+      <p:cxnSp>
+        <p:nvCxnSpPr>
+          <p:cNvPr id="137" name="Shape 137"/>
+          <p:cNvCxnSpPr/>
+          <p:nvPr/>
+        </p:nvCxnSpPr>
+        <p:spPr>
+          <a:xfrm>
+            <a:off x="3625150" y="2456750"/>
+            <a:ext cx="611700" cy="0"/>
+          </a:xfrm>
+          <a:prstGeom prst="straightConnector1">
+            <a:avLst/>
+          </a:prstGeom>
+          <a:noFill/>
+          <a:ln cap="flat" cmpd="sng" w="9525">
+            <a:solidFill>
+              <a:schemeClr val="dk2"/>
+            </a:solidFill>
+            <a:prstDash val="solid"/>
+            <a:round/>
+            <a:headEnd len="lg" w="lg" type="none"/>
+            <a:tailEnd len="lg" w="lg" type="none"/>
+          </a:ln>
+        </p:spPr>
+      </p:cxnSp>
+      <p:cxnSp>
+        <p:nvCxnSpPr>
+          <p:cNvPr id="138" name="Shape 138"/>
+          <p:cNvCxnSpPr/>
+          <p:nvPr/>
+        </p:nvCxnSpPr>
+        <p:spPr>
+          <a:xfrm>
+            <a:off x="3625150" y="2761550"/>
+            <a:ext cx="611700" cy="0"/>
+          </a:xfrm>
+          <a:prstGeom prst="straightConnector1">
+            <a:avLst/>
+          </a:prstGeom>
+          <a:noFill/>
+          <a:ln cap="flat" cmpd="sng" w="9525">
+            <a:solidFill>
+              <a:schemeClr val="dk2"/>
+            </a:solidFill>
+            <a:prstDash val="solid"/>
+            <a:round/>
+            <a:headEnd len="lg" w="lg" type="none"/>
+            <a:tailEnd len="lg" w="lg" type="none"/>
+          </a:ln>
+        </p:spPr>
+      </p:cxnSp>
+      <p:sp>
+        <p:nvSpPr>
+          <p:cNvPr id="139" name="Shape 139"/>
+          <p:cNvSpPr txBox="1"/>
+          <p:nvPr/>
+        </p:nvSpPr>
+        <p:spPr>
+          <a:xfrm>
+            <a:off x="4224400" y="1756550"/>
+            <a:ext cx="534300" cy="166800"/>
+          </a:xfrm>
+          <a:prstGeom prst="rect">
+            <a:avLst/>
+          </a:prstGeom>
+          <a:noFill/>
+          <a:ln>
+            <a:noFill/>
+          </a:ln>
+        </p:spPr>
+        <p:txBody>
+          <a:bodyPr anchorCtr="0" anchor="t" bIns="91425" lIns="91425" rIns="91425" tIns="91425">
+            <a:noAutofit/>
+          </a:bodyPr>
+          <a:lstStyle/>
+          <a:p>
+            <a:pPr lvl="0">
+              <a:spcBef>
+                <a:spcPts val="0"/>
+              </a:spcBef>
+              <a:buNone/>
+            </a:pPr>
+            <a:r>
+              <a:rPr lang="en" sz="800"/>
+              <a:t>000</a:t>
+            </a:r>
+          </a:p>
+        </p:txBody>
+      </p:sp>
+      <p:sp>
+        <p:nvSpPr>
+          <p:cNvPr id="140" name="Shape 140"/>
+          <p:cNvSpPr txBox="1"/>
+          <p:nvPr/>
+        </p:nvSpPr>
+        <p:spPr>
+          <a:xfrm>
+            <a:off x="4224400" y="1985150"/>
+            <a:ext cx="534300" cy="166800"/>
+          </a:xfrm>
+          <a:prstGeom prst="rect">
+            <a:avLst/>
+          </a:prstGeom>
+          <a:noFill/>
+          <a:ln>
+            <a:noFill/>
+          </a:ln>
+        </p:spPr>
+        <p:txBody>
+          <a:bodyPr anchorCtr="0" anchor="t" bIns="91425" lIns="91425" rIns="91425" tIns="91425">
+            <a:noAutofit/>
+          </a:bodyPr>
+          <a:lstStyle/>
+          <a:p>
+            <a:pPr lvl="0" rtl="0">
+              <a:spcBef>
+                <a:spcPts val="0"/>
+              </a:spcBef>
+              <a:buNone/>
+            </a:pPr>
+            <a:r>
+              <a:rPr lang="en" sz="800"/>
+              <a:t>0</a:t>
+            </a:r>
+            <a:r>
+              <a:rPr lang="en" sz="800"/>
+              <a:t>01</a:t>
+            </a:r>
+          </a:p>
+        </p:txBody>
+      </p:sp>
+      <p:sp>
+        <p:nvSpPr>
+          <p:cNvPr id="141" name="Shape 141"/>
+          <p:cNvSpPr txBox="1"/>
+          <p:nvPr/>
+        </p:nvSpPr>
+        <p:spPr>
+          <a:xfrm>
+            <a:off x="4224400" y="2289950"/>
+            <a:ext cx="534300" cy="166800"/>
+          </a:xfrm>
+          <a:prstGeom prst="rect">
+            <a:avLst/>
+          </a:prstGeom>
+          <a:noFill/>
+          <a:ln>
+            <a:noFill/>
+          </a:ln>
+        </p:spPr>
+        <p:txBody>
+          <a:bodyPr anchorCtr="0" anchor="t" bIns="91425" lIns="91425" rIns="91425" tIns="91425">
+            <a:noAutofit/>
+          </a:bodyPr>
+          <a:lstStyle/>
+          <a:p>
+            <a:pPr lvl="0" rtl="0">
+              <a:spcBef>
+                <a:spcPts val="0"/>
+              </a:spcBef>
+              <a:buNone/>
+            </a:pPr>
+            <a:r>
+              <a:rPr lang="en" sz="800"/>
+              <a:t>010</a:t>
+            </a:r>
+          </a:p>
+        </p:txBody>
+      </p:sp>
+      <p:sp>
+        <p:nvSpPr>
+          <p:cNvPr id="142" name="Shape 142"/>
+          <p:cNvSpPr txBox="1"/>
+          <p:nvPr/>
+        </p:nvSpPr>
+        <p:spPr>
+          <a:xfrm>
+            <a:off x="4224400" y="2594750"/>
+            <a:ext cx="534300" cy="166800"/>
+          </a:xfrm>
+          <a:prstGeom prst="rect">
+            <a:avLst/>
+          </a:prstGeom>
+          <a:noFill/>
+          <a:ln>
+            <a:noFill/>
+          </a:ln>
+        </p:spPr>
+        <p:txBody>
+          <a:bodyPr anchorCtr="0" anchor="t" bIns="91425" lIns="91425" rIns="91425" tIns="91425">
+            <a:noAutofit/>
+          </a:bodyPr>
+          <a:lstStyle/>
+          <a:p>
+            <a:pPr lvl="0" rtl="0">
+              <a:spcBef>
+                <a:spcPts val="0"/>
+              </a:spcBef>
+              <a:buNone/>
+            </a:pPr>
+            <a:r>
+              <a:rPr lang="en" sz="800"/>
+              <a:t>011</a:t>
+            </a:r>
+          </a:p>
+        </p:txBody>
+      </p:sp>
+      <p:sp>
+        <p:nvSpPr>
+          <p:cNvPr id="143" name="Shape 143"/>
+          <p:cNvSpPr txBox="1"/>
+          <p:nvPr/>
+        </p:nvSpPr>
+        <p:spPr>
+          <a:xfrm>
+            <a:off x="3083675" y="1694225"/>
+            <a:ext cx="617700" cy="381600"/>
+          </a:xfrm>
+          <a:prstGeom prst="rect">
+            <a:avLst/>
+          </a:prstGeom>
+          <a:noFill/>
+          <a:ln>
+            <a:noFill/>
+          </a:ln>
+        </p:spPr>
+        <p:txBody>
+          <a:bodyPr anchorCtr="0" anchor="t" bIns="91425" lIns="91425" rIns="91425" tIns="91425">
+            <a:noAutofit/>
+          </a:bodyPr>
+          <a:lstStyle/>
+          <a:p>
+            <a:pPr lvl="0">
+              <a:spcBef>
+                <a:spcPts val="0"/>
+              </a:spcBef>
+              <a:buNone/>
+            </a:pPr>
+            <a:r>
+              <a:rPr lang="en"/>
+              <a:t>AND</a:t>
+            </a:r>
+          </a:p>
+        </p:txBody>
+      </p:sp>
+      <p:sp>
+        <p:nvSpPr>
+          <p:cNvPr id="144" name="Shape 144"/>
+          <p:cNvSpPr txBox="1"/>
+          <p:nvPr/>
+        </p:nvSpPr>
+        <p:spPr>
+          <a:xfrm>
+            <a:off x="3143250" y="1961150"/>
+            <a:ext cx="663000" cy="381600"/>
+          </a:xfrm>
+          <a:prstGeom prst="rect">
+            <a:avLst/>
+          </a:prstGeom>
+          <a:noFill/>
+          <a:ln>
+            <a:noFill/>
+          </a:ln>
+        </p:spPr>
+        <p:txBody>
+          <a:bodyPr anchorCtr="0" anchor="t" bIns="91425" lIns="91425" rIns="91425" tIns="91425">
+            <a:noAutofit/>
+          </a:bodyPr>
+          <a:lstStyle/>
+          <a:p>
+            <a:pPr lvl="0" rtl="0">
+              <a:spcBef>
+                <a:spcPts val="0"/>
+              </a:spcBef>
+              <a:buNone/>
+            </a:pPr>
+            <a:r>
+              <a:rPr lang="en"/>
+              <a:t>CMP</a:t>
+            </a:r>
+          </a:p>
+        </p:txBody>
+      </p:sp>
+      <p:sp>
+        <p:nvSpPr>
+          <p:cNvPr id="145" name="Shape 145"/>
+          <p:cNvSpPr txBox="1"/>
+          <p:nvPr/>
+        </p:nvSpPr>
+        <p:spPr>
+          <a:xfrm>
+            <a:off x="3083675" y="2227625"/>
+            <a:ext cx="617700" cy="381600"/>
+          </a:xfrm>
+          <a:prstGeom prst="rect">
+            <a:avLst/>
+          </a:prstGeom>
+          <a:noFill/>
+          <a:ln>
+            <a:noFill/>
+          </a:ln>
+        </p:spPr>
+        <p:txBody>
+          <a:bodyPr anchorCtr="0" anchor="t" bIns="91425" lIns="91425" rIns="91425" tIns="91425">
+            <a:noAutofit/>
+          </a:bodyPr>
+          <a:lstStyle/>
+          <a:p>
+            <a:pPr lvl="0" rtl="0">
+              <a:spcBef>
+                <a:spcPts val="0"/>
+              </a:spcBef>
+              <a:buNone/>
+            </a:pPr>
+            <a:r>
+              <a:rPr lang="en"/>
+              <a:t>ADD</a:t>
+            </a:r>
+          </a:p>
+        </p:txBody>
+      </p:sp>
+      <p:sp>
+        <p:nvSpPr>
+          <p:cNvPr id="146" name="Shape 146"/>
+          <p:cNvSpPr txBox="1"/>
+          <p:nvPr/>
+        </p:nvSpPr>
+        <p:spPr>
+          <a:xfrm>
+            <a:off x="3083675" y="2532425"/>
+            <a:ext cx="617700" cy="381600"/>
+          </a:xfrm>
+          <a:prstGeom prst="rect">
+            <a:avLst/>
+          </a:prstGeom>
+          <a:noFill/>
+          <a:ln>
+            <a:noFill/>
+          </a:ln>
+        </p:spPr>
+        <p:txBody>
+          <a:bodyPr anchorCtr="0" anchor="t" bIns="91425" lIns="91425" rIns="91425" tIns="91425">
+            <a:noAutofit/>
+          </a:bodyPr>
+          <a:lstStyle/>
+          <a:p>
+            <a:pPr lvl="0" rtl="0">
+              <a:spcBef>
+                <a:spcPts val="0"/>
+              </a:spcBef>
+              <a:buNone/>
+            </a:pPr>
+            <a:r>
+              <a:rPr lang="en"/>
+              <a:t>SUB</a:t>
+            </a:r>
+          </a:p>
+        </p:txBody>
+      </p:sp>
+      <p:cxnSp>
+        <p:nvCxnSpPr>
+          <p:cNvPr id="147" name="Shape 147"/>
+          <p:cNvCxnSpPr/>
+          <p:nvPr/>
+        </p:nvCxnSpPr>
+        <p:spPr>
+          <a:xfrm>
+            <a:off x="4834900" y="3668750"/>
+            <a:ext cx="0" cy="795300"/>
+          </a:xfrm>
+          <a:prstGeom prst="straightConnector1">
+            <a:avLst/>
+          </a:prstGeom>
+          <a:noFill/>
+          <a:ln cap="flat" cmpd="sng" w="9525">
+            <a:solidFill>
+              <a:schemeClr val="dk2"/>
+            </a:solidFill>
+            <a:prstDash val="solid"/>
+            <a:round/>
+            <a:headEnd len="lg" w="lg" type="none"/>
+            <a:tailEnd len="lg" w="lg" type="none"/>
+          </a:ln>
+        </p:spPr>
+      </p:cxnSp>
+      <p:cxnSp>
+        <p:nvCxnSpPr>
+          <p:cNvPr id="148" name="Shape 148"/>
+          <p:cNvCxnSpPr/>
+          <p:nvPr/>
+        </p:nvCxnSpPr>
+        <p:spPr>
+          <a:xfrm>
+            <a:off x="5215900" y="3516350"/>
+            <a:ext cx="0" cy="795300"/>
+          </a:xfrm>
+          <a:prstGeom prst="straightConnector1">
+            <a:avLst/>
+          </a:prstGeom>
+          <a:noFill/>
+          <a:ln cap="flat" cmpd="sng" w="9525">
+            <a:solidFill>
+              <a:schemeClr val="dk2"/>
+            </a:solidFill>
+            <a:prstDash val="solid"/>
+            <a:round/>
+            <a:headEnd len="lg" w="lg" type="none"/>
+            <a:tailEnd len="lg" w="lg" type="none"/>
+          </a:ln>
+        </p:spPr>
+      </p:cxnSp>
+      <p:sp>
+        <p:nvSpPr>
+          <p:cNvPr id="149" name="Shape 149"/>
+          <p:cNvSpPr txBox="1"/>
+          <p:nvPr/>
+        </p:nvSpPr>
+        <p:spPr>
+          <a:xfrm>
+            <a:off x="4620962" y="4464050"/>
+            <a:ext cx="406200" cy="166800"/>
+          </a:xfrm>
+          <a:prstGeom prst="rect">
+            <a:avLst/>
+          </a:prstGeom>
+          <a:noFill/>
+          <a:ln>
+            <a:noFill/>
+          </a:ln>
+        </p:spPr>
+        <p:txBody>
+          <a:bodyPr anchorCtr="0" anchor="t" bIns="91425" lIns="91425" rIns="91425" tIns="91425">
+            <a:noAutofit/>
+          </a:bodyPr>
+          <a:lstStyle/>
+          <a:p>
+            <a:pPr lvl="0" rtl="0">
+              <a:spcBef>
+                <a:spcPts val="0"/>
+              </a:spcBef>
+              <a:buNone/>
+            </a:pPr>
+            <a:r>
+              <a:rPr lang="en"/>
+              <a:t>S0</a:t>
+            </a:r>
+          </a:p>
+        </p:txBody>
+      </p:sp>
+      <p:sp>
+        <p:nvSpPr>
+          <p:cNvPr id="150" name="Shape 150"/>
+          <p:cNvSpPr txBox="1"/>
+          <p:nvPr/>
+        </p:nvSpPr>
+        <p:spPr>
+          <a:xfrm>
+            <a:off x="5001962" y="4387850"/>
+            <a:ext cx="406200" cy="166800"/>
+          </a:xfrm>
+          <a:prstGeom prst="rect">
+            <a:avLst/>
+          </a:prstGeom>
+          <a:noFill/>
+          <a:ln>
+            <a:noFill/>
+          </a:ln>
+        </p:spPr>
+        <p:txBody>
+          <a:bodyPr anchorCtr="0" anchor="t" bIns="91425" lIns="91425" rIns="91425" tIns="91425">
+            <a:noAutofit/>
+          </a:bodyPr>
+          <a:lstStyle/>
+          <a:p>
+            <a:pPr lvl="0" rtl="0">
+              <a:spcBef>
+                <a:spcPts val="0"/>
+              </a:spcBef>
+              <a:buNone/>
+            </a:pPr>
+            <a:r>
+              <a:rPr lang="en"/>
+              <a:t>S1</a:t>
+            </a:r>
+          </a:p>
+        </p:txBody>
+      </p:sp>
+      <p:cxnSp>
+        <p:nvCxnSpPr>
+          <p:cNvPr id="151" name="Shape 151"/>
+          <p:cNvCxnSpPr/>
+          <p:nvPr/>
+        </p:nvCxnSpPr>
+        <p:spPr>
+          <a:xfrm>
+            <a:off x="5673100" y="3440150"/>
+            <a:ext cx="0" cy="795300"/>
+          </a:xfrm>
+          <a:prstGeom prst="straightConnector1">
+            <a:avLst/>
+          </a:prstGeom>
+          <a:noFill/>
+          <a:ln cap="flat" cmpd="sng" w="9525">
+            <a:solidFill>
+              <a:schemeClr val="dk2"/>
+            </a:solidFill>
+            <a:prstDash val="solid"/>
+            <a:round/>
+            <a:headEnd len="lg" w="lg" type="none"/>
+            <a:tailEnd len="lg" w="lg" type="none"/>
+          </a:ln>
+        </p:spPr>
+      </p:cxnSp>
+      <p:sp>
+        <p:nvSpPr>
+          <p:cNvPr id="152" name="Shape 152"/>
+          <p:cNvSpPr txBox="1"/>
+          <p:nvPr/>
+        </p:nvSpPr>
+        <p:spPr>
+          <a:xfrm>
+            <a:off x="5459162" y="4235450"/>
+            <a:ext cx="406200" cy="166800"/>
+          </a:xfrm>
+          <a:prstGeom prst="rect">
+            <a:avLst/>
+          </a:prstGeom>
+          <a:noFill/>
+          <a:ln>
+            <a:noFill/>
+          </a:ln>
+        </p:spPr>
+        <p:txBody>
+          <a:bodyPr anchorCtr="0" anchor="t" bIns="91425" lIns="91425" rIns="91425" tIns="91425">
+            <a:noAutofit/>
+          </a:bodyPr>
+          <a:lstStyle/>
+          <a:p>
+            <a:pPr lvl="0" rtl="0">
+              <a:spcBef>
+                <a:spcPts val="0"/>
+              </a:spcBef>
+              <a:buNone/>
+            </a:pPr>
+            <a:r>
+              <a:rPr lang="en"/>
+              <a:t>S2</a:t>
+            </a:r>
+          </a:p>
+        </p:txBody>
+      </p:sp>
+      <p:sp>
+        <p:nvSpPr>
+          <p:cNvPr id="153" name="Shape 153"/>
+          <p:cNvSpPr txBox="1"/>
+          <p:nvPr/>
+        </p:nvSpPr>
+        <p:spPr>
+          <a:xfrm>
+            <a:off x="4224400" y="2823350"/>
+            <a:ext cx="534300" cy="166800"/>
+          </a:xfrm>
+          <a:prstGeom prst="rect">
+            <a:avLst/>
+          </a:prstGeom>
+          <a:noFill/>
+          <a:ln>
+            <a:noFill/>
+          </a:ln>
+        </p:spPr>
+        <p:txBody>
+          <a:bodyPr anchorCtr="0" anchor="t" bIns="91425" lIns="91425" rIns="91425" tIns="91425">
+            <a:noAutofit/>
+          </a:bodyPr>
+          <a:lstStyle/>
+          <a:p>
+            <a:pPr lvl="0" rtl="0">
+              <a:spcBef>
+                <a:spcPts val="0"/>
+              </a:spcBef>
+              <a:buNone/>
+            </a:pPr>
+            <a:r>
+              <a:rPr lang="en" sz="800"/>
+              <a:t>100</a:t>
+            </a:r>
+          </a:p>
+        </p:txBody>
+      </p:sp>
+      <p:sp>
+        <p:nvSpPr>
+          <p:cNvPr id="154" name="Shape 154"/>
+          <p:cNvSpPr txBox="1"/>
+          <p:nvPr/>
+        </p:nvSpPr>
+        <p:spPr>
+          <a:xfrm>
+            <a:off x="4224400" y="3051950"/>
+            <a:ext cx="534300" cy="166800"/>
+          </a:xfrm>
+          <a:prstGeom prst="rect">
+            <a:avLst/>
+          </a:prstGeom>
+          <a:noFill/>
+          <a:ln>
+            <a:noFill/>
+          </a:ln>
+        </p:spPr>
+        <p:txBody>
+          <a:bodyPr anchorCtr="0" anchor="t" bIns="91425" lIns="91425" rIns="91425" tIns="91425">
+            <a:noAutofit/>
+          </a:bodyPr>
+          <a:lstStyle/>
+          <a:p>
+            <a:pPr lvl="0" rtl="0">
+              <a:spcBef>
+                <a:spcPts val="0"/>
+              </a:spcBef>
+              <a:buNone/>
+            </a:pPr>
+            <a:r>
+              <a:rPr lang="en" sz="800"/>
+              <a:t>101</a:t>
+            </a:r>
+          </a:p>
+        </p:txBody>
+      </p:sp>
+      <p:sp>
+        <p:nvSpPr>
+          <p:cNvPr id="155" name="Shape 155"/>
+          <p:cNvSpPr txBox="1"/>
+          <p:nvPr/>
+        </p:nvSpPr>
+        <p:spPr>
+          <a:xfrm>
+            <a:off x="4224400" y="3280550"/>
+            <a:ext cx="534300" cy="166800"/>
+          </a:xfrm>
+          <a:prstGeom prst="rect">
+            <a:avLst/>
+          </a:prstGeom>
+          <a:noFill/>
+          <a:ln>
+            <a:noFill/>
+          </a:ln>
+        </p:spPr>
+        <p:txBody>
+          <a:bodyPr anchorCtr="0" anchor="t" bIns="91425" lIns="91425" rIns="91425" tIns="91425">
+            <a:noAutofit/>
+          </a:bodyPr>
+          <a:lstStyle/>
+          <a:p>
+            <a:pPr lvl="0" rtl="0">
+              <a:spcBef>
+                <a:spcPts val="0"/>
+              </a:spcBef>
+              <a:buNone/>
+            </a:pPr>
+            <a:r>
+              <a:rPr lang="en" sz="800"/>
+              <a:t>110</a:t>
+            </a:r>
+          </a:p>
+        </p:txBody>
+      </p:sp>
+      <p:sp>
+        <p:nvSpPr>
+          <p:cNvPr id="156" name="Shape 156"/>
+          <p:cNvSpPr txBox="1"/>
+          <p:nvPr/>
+        </p:nvSpPr>
+        <p:spPr>
+          <a:xfrm>
+            <a:off x="3083675" y="2761025"/>
+            <a:ext cx="617700" cy="381600"/>
+          </a:xfrm>
+          <a:prstGeom prst="rect">
+            <a:avLst/>
+          </a:prstGeom>
+          <a:noFill/>
+          <a:ln>
+            <a:noFill/>
+          </a:ln>
+        </p:spPr>
+        <p:txBody>
+          <a:bodyPr anchorCtr="0" anchor="t" bIns="91425" lIns="91425" rIns="91425" tIns="91425">
+            <a:noAutofit/>
+          </a:bodyPr>
+          <a:lstStyle/>
+          <a:p>
+            <a:pPr lvl="0" rtl="0">
+              <a:spcBef>
+                <a:spcPts val="0"/>
+              </a:spcBef>
+              <a:buNone/>
+            </a:pPr>
+            <a:r>
+              <a:rPr lang="en"/>
+              <a:t>MOD</a:t>
+            </a:r>
+          </a:p>
+        </p:txBody>
+      </p:sp>
+      <p:sp>
+        <p:nvSpPr>
+          <p:cNvPr id="157" name="Shape 157"/>
+          <p:cNvSpPr txBox="1"/>
+          <p:nvPr/>
+        </p:nvSpPr>
+        <p:spPr>
+          <a:xfrm>
+            <a:off x="3312275" y="2989625"/>
+            <a:ext cx="617700" cy="381600"/>
+          </a:xfrm>
+          <a:prstGeom prst="rect">
+            <a:avLst/>
+          </a:prstGeom>
+          <a:noFill/>
+          <a:ln>
+            <a:noFill/>
+          </a:ln>
+        </p:spPr>
+        <p:txBody>
+          <a:bodyPr anchorCtr="0" anchor="t" bIns="91425" lIns="91425" rIns="91425" tIns="91425">
+            <a:noAutofit/>
+          </a:bodyPr>
+          <a:lstStyle/>
+          <a:p>
+            <a:pPr lvl="0" rtl="0">
+              <a:spcBef>
+                <a:spcPts val="0"/>
+              </a:spcBef>
+              <a:buNone/>
+            </a:pPr>
+            <a:r>
+              <a:rPr lang="en"/>
+              <a:t>1</a:t>
+            </a:r>
+          </a:p>
+        </p:txBody>
+      </p:sp>
+      <p:sp>
+        <p:nvSpPr>
+          <p:cNvPr id="158" name="Shape 158"/>
+          <p:cNvSpPr txBox="1"/>
+          <p:nvPr/>
+        </p:nvSpPr>
+        <p:spPr>
+          <a:xfrm>
+            <a:off x="3312275" y="3218750"/>
+            <a:ext cx="617700" cy="381600"/>
+          </a:xfrm>
+          <a:prstGeom prst="rect">
+            <a:avLst/>
+          </a:prstGeom>
+          <a:noFill/>
+          <a:ln>
+            <a:noFill/>
+          </a:ln>
+        </p:spPr>
+        <p:txBody>
+          <a:bodyPr anchorCtr="0" anchor="t" bIns="91425" lIns="91425" rIns="91425" tIns="91425">
+            <a:noAutofit/>
+          </a:bodyPr>
+          <a:lstStyle/>
+          <a:p>
+            <a:pPr lvl="0" rtl="0">
+              <a:spcBef>
+                <a:spcPts val="0"/>
+              </a:spcBef>
+              <a:buNone/>
+            </a:pPr>
+            <a:r>
+              <a:rPr lang="en"/>
+              <a:t>8</a:t>
+            </a:r>
+          </a:p>
+        </p:txBody>
+      </p:sp>
+      <p:cxnSp>
+        <p:nvCxnSpPr>
+          <p:cNvPr id="159" name="Shape 159"/>
+          <p:cNvCxnSpPr/>
+          <p:nvPr/>
+        </p:nvCxnSpPr>
+        <p:spPr>
+          <a:xfrm>
+            <a:off x="3625150" y="2990150"/>
+            <a:ext cx="611700" cy="0"/>
+          </a:xfrm>
+          <a:prstGeom prst="straightConnector1">
+            <a:avLst/>
+          </a:prstGeom>
+          <a:noFill/>
+          <a:ln cap="flat" cmpd="sng" w="9525">
+            <a:solidFill>
+              <a:schemeClr val="dk2"/>
+            </a:solidFill>
+            <a:prstDash val="solid"/>
+            <a:round/>
+            <a:headEnd len="lg" w="lg" type="none"/>
+            <a:tailEnd len="lg" w="lg" type="none"/>
+          </a:ln>
+        </p:spPr>
+      </p:cxnSp>
+      <p:cxnSp>
+        <p:nvCxnSpPr>
+          <p:cNvPr id="160" name="Shape 160"/>
+          <p:cNvCxnSpPr/>
+          <p:nvPr/>
+        </p:nvCxnSpPr>
+        <p:spPr>
+          <a:xfrm>
+            <a:off x="3625150" y="3218750"/>
+            <a:ext cx="611700" cy="0"/>
+          </a:xfrm>
+          <a:prstGeom prst="straightConnector1">
+            <a:avLst/>
+          </a:prstGeom>
+          <a:noFill/>
+          <a:ln cap="flat" cmpd="sng" w="9525">
+            <a:solidFill>
+              <a:schemeClr val="dk2"/>
+            </a:solidFill>
+            <a:prstDash val="solid"/>
+            <a:round/>
+            <a:headEnd len="lg" w="lg" type="none"/>
+            <a:tailEnd len="lg" w="lg" type="none"/>
+          </a:ln>
+        </p:spPr>
+      </p:cxnSp>
+      <p:cxnSp>
+        <p:nvCxnSpPr>
+          <p:cNvPr id="161" name="Shape 161"/>
+          <p:cNvCxnSpPr/>
+          <p:nvPr/>
+        </p:nvCxnSpPr>
+        <p:spPr>
+          <a:xfrm>
+            <a:off x="3625150" y="3447350"/>
+            <a:ext cx="611700" cy="0"/>
+          </a:xfrm>
+          <a:prstGeom prst="straightConnector1">
+            <a:avLst/>
+          </a:prstGeom>
+          <a:noFill/>
+          <a:ln cap="flat" cmpd="sng" w="9525">
+            <a:solidFill>
+              <a:schemeClr val="dk2"/>
+            </a:solidFill>
+            <a:prstDash val="solid"/>
+            <a:round/>
+            <a:headEnd len="lg" w="lg" type="none"/>
+            <a:tailEnd len="lg" w="lg" type="none"/>
+          </a:ln>
+        </p:spPr>
+      </p:cxnSp>
+    </p:spTree>
+  </p:cSld>
+  <p:clrMapOvr>
+    <a:masterClrMapping/>
+  </p:clrMapOvr>
+</p:sld>
+</file>
+
+<file path=ppt/slides/slide14.xml><?xml version="1.0" encoding="utf-8"?>
+<p:sld xmlns:a="http://schemas.openxmlformats.org/drawingml/2006/main" xmlns:r="http://schemas.openxmlformats.org/officeDocument/2006/relationships" xmlns:mc="http://schemas.openxmlformats.org/markup-compatibility/2006" xmlns:mv="urn:schemas-microsoft-com:mac:vml" xmlns:p="http://schemas.openxmlformats.org/presentationml/2006/main" xmlns:c="http://schemas.openxmlformats.org/drawingml/2006/chart" xmlns:dgm="http://schemas.openxmlformats.org/drawingml/2006/diagram" xmlns:o="urn:schemas-microsoft-com:office:office" xmlns:v="urn:schemas-microsoft-com:vml" xmlns:pvml="urn:schemas-microsoft-com:office:powerpoint" xmlns:com="http://schemas.openxmlformats.org/drawingml/2006/compatibility" xmlns:p14="http://schemas.microsoft.com/office/powerpoint/2010/main">
+  <p:cSld>
+    <p:spTree>
+      <p:nvGrpSpPr>
+        <p:cNvPr id="165" name="Shape 165"/>
+        <p:cNvGrpSpPr/>
+        <p:nvPr/>
+      </p:nvGrpSpPr>
+      <p:grpSpPr>
+        <a:xfrm>
+          <a:off x="0" y="0"/>
+          <a:ext cx="0" cy="0"/>
+          <a:chOff x="0" y="0"/>
+          <a:chExt cx="0" cy="0"/>
+        </a:xfrm>
+      </p:grpSpPr>
+      <p:sp>
+        <p:nvSpPr>
+          <p:cNvPr id="166" name="Shape 166"/>
+          <p:cNvSpPr txBox="1"/>
+          <p:nvPr>
+            <p:ph type="title"/>
+          </p:nvPr>
+        </p:nvSpPr>
+        <p:spPr>
+          <a:xfrm>
+            <a:off x="311700" y="292850"/>
+            <a:ext cx="8520600" cy="801000"/>
+          </a:xfrm>
+          <a:prstGeom prst="rect">
+            <a:avLst/>
+          </a:prstGeom>
+        </p:spPr>
+        <p:txBody>
+          <a:bodyPr anchorCtr="0" anchor="t" bIns="91425" lIns="91425" rIns="91425" tIns="91425">
+            <a:noAutofit/>
+          </a:bodyPr>
+          <a:lstStyle/>
+          <a:p>
+            <a:pPr lvl="0" rtl="0">
+              <a:spcBef>
+                <a:spcPts val="0"/>
+              </a:spcBef>
+              <a:buNone/>
+            </a:pPr>
+            <a:r>
+              <a:rPr lang="en"/>
+              <a:t>Control Unit (</a:t>
+            </a:r>
+            <a:r>
+              <a:rPr lang="en"/>
+              <a:t>Microprogrammed</a:t>
+            </a:r>
+            <a:r>
+              <a:rPr lang="en"/>
+              <a:t> Control)</a:t>
+            </a:r>
+          </a:p>
+        </p:txBody>
+      </p:sp>
+      <p:sp>
+        <p:nvSpPr>
+          <p:cNvPr id="167" name="Shape 167"/>
+          <p:cNvSpPr txBox="1"/>
+          <p:nvPr>
+            <p:ph idx="1" type="body"/>
+          </p:nvPr>
+        </p:nvSpPr>
+        <p:spPr>
+          <a:xfrm>
+            <a:off x="311700" y="1228675"/>
+            <a:ext cx="8520600" cy="3340200"/>
+          </a:xfrm>
+          <a:prstGeom prst="rect">
+            <a:avLst/>
+          </a:prstGeom>
+        </p:spPr>
+        <p:txBody>
+          <a:bodyPr anchorCtr="0" anchor="t" bIns="91425" lIns="91425" rIns="91425" tIns="91425">
+            <a:noAutofit/>
+          </a:bodyPr>
+          <a:lstStyle/>
+          <a:p>
+            <a:pPr indent="-228600" lvl="0" marL="457200" rtl="0">
+              <a:lnSpc>
+                <a:spcPct val="100000"/>
+              </a:lnSpc>
+              <a:spcBef>
+                <a:spcPts val="0"/>
+              </a:spcBef>
+              <a:spcAft>
+                <a:spcPts val="1000"/>
+              </a:spcAft>
+            </a:pPr>
+            <a:r>
+              <a:rPr b="1" lang="en"/>
+              <a:t>Fetch Cycle</a:t>
+            </a:r>
+            <a:r>
+              <a:rPr lang="en"/>
+              <a:t> :</a:t>
+            </a:r>
+          </a:p>
+          <a:p>
+            <a:pPr indent="-228600" lvl="1" marL="914400" rtl="0">
+              <a:lnSpc>
+                <a:spcPct val="100000"/>
+              </a:lnSpc>
+              <a:spcBef>
+                <a:spcPts val="0"/>
+              </a:spcBef>
+              <a:spcAft>
+                <a:spcPts val="1000"/>
+              </a:spcAft>
+            </a:pPr>
+            <a:r>
+              <a:rPr lang="en"/>
+              <a:t>PC</a:t>
+            </a:r>
+            <a:r>
+              <a:rPr baseline="-25000" lang="en"/>
+              <a:t>OUT</a:t>
+            </a:r>
+            <a:r>
+              <a:rPr lang="en"/>
+              <a:t>, R=C, MAR</a:t>
+            </a:r>
+            <a:r>
+              <a:rPr baseline="-25000" lang="en"/>
+              <a:t>IN</a:t>
+            </a:r>
+            <a:r>
+              <a:rPr lang="en"/>
+              <a:t>, READ, IncPC</a:t>
+            </a:r>
+          </a:p>
+          <a:p>
+            <a:pPr indent="-228600" lvl="1" marL="914400" rtl="0">
+              <a:lnSpc>
+                <a:spcPct val="100000"/>
+              </a:lnSpc>
+              <a:spcBef>
+                <a:spcPts val="0"/>
+              </a:spcBef>
+              <a:spcAft>
+                <a:spcPts val="1000"/>
+              </a:spcAft>
+            </a:pPr>
+            <a:r>
+              <a:rPr lang="en"/>
+              <a:t>WMFC</a:t>
+            </a:r>
+          </a:p>
+          <a:p>
+            <a:pPr indent="-228600" lvl="1" marL="914400" rtl="0">
+              <a:lnSpc>
+                <a:spcPct val="100000"/>
+              </a:lnSpc>
+              <a:spcBef>
+                <a:spcPts val="0"/>
+              </a:spcBef>
+              <a:spcAft>
+                <a:spcPts val="1000"/>
+              </a:spcAft>
+            </a:pPr>
+            <a:r>
+              <a:rPr lang="en"/>
+              <a:t>MDR</a:t>
+            </a:r>
+            <a:r>
+              <a:rPr baseline="-25000" lang="en"/>
+              <a:t>OUTC</a:t>
+            </a:r>
+            <a:r>
+              <a:rPr lang="en"/>
+              <a:t>, R=C, IR</a:t>
+            </a:r>
+            <a:r>
+              <a:rPr baseline="-25000" lang="en"/>
+              <a:t>IN</a:t>
+            </a:r>
+          </a:p>
+          <a:p>
+            <a:pPr lvl="0" rtl="0">
+              <a:lnSpc>
+                <a:spcPct val="100000"/>
+              </a:lnSpc>
+              <a:spcBef>
+                <a:spcPts val="0"/>
+              </a:spcBef>
+              <a:spcAft>
+                <a:spcPts val="1000"/>
+              </a:spcAft>
+              <a:buNone/>
+            </a:pPr>
+            <a:r>
+              <a:t/>
+            </a:r>
+            <a:endParaRPr baseline="-25000"/>
+          </a:p>
+        </p:txBody>
+      </p:sp>
+    </p:spTree>
+  </p:cSld>
+  <p:clrMapOvr>
+    <a:masterClrMapping/>
+  </p:clrMapOvr>
+</p:sld>
+</file>
+
+<file path=ppt/slides/slide15.xml><?xml version="1.0" encoding="utf-8"?>
+<p:sld xmlns:a="http://schemas.openxmlformats.org/drawingml/2006/main" xmlns:r="http://schemas.openxmlformats.org/officeDocument/2006/relationships" xmlns:mc="http://schemas.openxmlformats.org/markup-compatibility/2006" xmlns:mv="urn:schemas-microsoft-com:mac:vml" xmlns:p="http://schemas.openxmlformats.org/presentationml/2006/main" xmlns:c="http://schemas.openxmlformats.org/drawingml/2006/chart" xmlns:dgm="http://schemas.openxmlformats.org/drawingml/2006/diagram" xmlns:o="urn:schemas-microsoft-com:office:office" xmlns:v="urn:schemas-microsoft-com:vml" xmlns:pvml="urn:schemas-microsoft-com:office:powerpoint" xmlns:com="http://schemas.openxmlformats.org/drawingml/2006/compatibility" xmlns:p14="http://schemas.microsoft.com/office/powerpoint/2010/main">
+  <p:cSld>
+    <p:spTree>
+      <p:nvGrpSpPr>
+        <p:cNvPr id="171" name="Shape 171"/>
+        <p:cNvGrpSpPr/>
+        <p:nvPr/>
+      </p:nvGrpSpPr>
+      <p:grpSpPr>
+        <a:xfrm>
+          <a:off x="0" y="0"/>
+          <a:ext cx="0" cy="0"/>
+          <a:chOff x="0" y="0"/>
+          <a:chExt cx="0" cy="0"/>
+        </a:xfrm>
+      </p:grpSpPr>
+      <p:sp>
+        <p:nvSpPr>
+          <p:cNvPr id="172" name="Shape 172"/>
+          <p:cNvSpPr txBox="1"/>
+          <p:nvPr>
+            <p:ph type="title"/>
+          </p:nvPr>
+        </p:nvSpPr>
+        <p:spPr>
+          <a:xfrm>
+            <a:off x="311700" y="292850"/>
+            <a:ext cx="8520600" cy="801000"/>
+          </a:xfrm>
+          <a:prstGeom prst="rect">
+            <a:avLst/>
+          </a:prstGeom>
+        </p:spPr>
+        <p:txBody>
+          <a:bodyPr anchorCtr="0" anchor="t" bIns="91425" lIns="91425" rIns="91425" tIns="91425">
+            <a:noAutofit/>
+          </a:bodyPr>
+          <a:lstStyle/>
+          <a:p>
+            <a:pPr lvl="0" rtl="0">
+              <a:spcBef>
+                <a:spcPts val="0"/>
+              </a:spcBef>
+              <a:buNone/>
+            </a:pPr>
+            <a:r>
+              <a:rPr lang="en"/>
+              <a:t>Micro Routines</a:t>
+            </a:r>
+          </a:p>
+        </p:txBody>
+      </p:sp>
+      <p:sp>
+        <p:nvSpPr>
+          <p:cNvPr id="173" name="Shape 173"/>
+          <p:cNvSpPr txBox="1"/>
+          <p:nvPr>
+            <p:ph idx="1" type="body"/>
+          </p:nvPr>
+        </p:nvSpPr>
+        <p:spPr>
+          <a:xfrm>
+            <a:off x="271050" y="1242225"/>
+            <a:ext cx="8520600" cy="3340200"/>
+          </a:xfrm>
+          <a:prstGeom prst="rect">
+            <a:avLst/>
+          </a:prstGeom>
+        </p:spPr>
+        <p:txBody>
+          <a:bodyPr anchorCtr="0" anchor="t" bIns="91425" lIns="91425" rIns="91425" tIns="91425">
+            <a:noAutofit/>
+          </a:bodyPr>
+          <a:lstStyle/>
+          <a:p>
+            <a:pPr indent="-228600" lvl="0" marL="457200" rtl="0">
+              <a:lnSpc>
+                <a:spcPct val="100000"/>
+              </a:lnSpc>
+              <a:spcBef>
+                <a:spcPts val="0"/>
+              </a:spcBef>
+              <a:spcAft>
+                <a:spcPts val="1000"/>
+              </a:spcAft>
+            </a:pPr>
+            <a:r>
+              <a:rPr b="1" lang="en"/>
+              <a:t>Pause</a:t>
+            </a:r>
+            <a:r>
+              <a:rPr lang="en"/>
+              <a:t> :</a:t>
+            </a:r>
+          </a:p>
+          <a:p>
+            <a:pPr indent="-228600" lvl="1" marL="914400" rtl="0">
+              <a:lnSpc>
+                <a:spcPct val="100000"/>
+              </a:lnSpc>
+              <a:spcBef>
+                <a:spcPts val="0"/>
+              </a:spcBef>
+              <a:spcAft>
+                <a:spcPts val="1000"/>
+              </a:spcAft>
+            </a:pPr>
+            <a:r>
+              <a:rPr lang="en"/>
+              <a:t>Set PP flag,END</a:t>
+            </a:r>
+          </a:p>
+          <a:p>
+            <a:pPr indent="-228600" lvl="0" marL="457200" rtl="0">
+              <a:lnSpc>
+                <a:spcPct val="100000"/>
+              </a:lnSpc>
+              <a:spcBef>
+                <a:spcPts val="0"/>
+              </a:spcBef>
+              <a:spcAft>
+                <a:spcPts val="1000"/>
+              </a:spcAft>
+            </a:pPr>
+            <a:r>
+              <a:rPr b="1" lang="en"/>
+              <a:t>DCS</a:t>
+            </a:r>
+            <a:r>
+              <a:rPr lang="en"/>
+              <a:t> :</a:t>
+            </a:r>
+          </a:p>
+          <a:p>
+            <a:pPr indent="-228600" lvl="1" marL="914400" rtl="0">
+              <a:lnSpc>
+                <a:spcPct val="100000"/>
+              </a:lnSpc>
+              <a:spcBef>
+                <a:spcPts val="0"/>
+              </a:spcBef>
+              <a:spcAft>
+                <a:spcPts val="1000"/>
+              </a:spcAft>
+            </a:pPr>
+            <a:r>
+              <a:rPr lang="en"/>
+              <a:t>R7out-B, Select 1, SUB-R07in, </a:t>
+            </a:r>
+          </a:p>
+          <a:p>
+            <a:pPr indent="-228600" lvl="1" marL="914400" rtl="0">
+              <a:lnSpc>
+                <a:spcPct val="100000"/>
+              </a:lnSpc>
+              <a:spcBef>
+                <a:spcPts val="0"/>
+              </a:spcBef>
+              <a:spcAft>
+                <a:spcPts val="1000"/>
+              </a:spcAft>
+            </a:pPr>
+            <a:r>
+              <a:rPr lang="en"/>
+              <a:t>R05out-B, Select 1, SUB-R05in, END </a:t>
+            </a:r>
+          </a:p>
+          <a:p>
+            <a:pPr indent="-228600" lvl="0" marL="457200" rtl="0">
+              <a:lnSpc>
+                <a:spcPct val="100000"/>
+              </a:lnSpc>
+              <a:spcBef>
+                <a:spcPts val="0"/>
+              </a:spcBef>
+              <a:spcAft>
+                <a:spcPts val="1000"/>
+              </a:spcAft>
+            </a:pPr>
+            <a:r>
+              <a:rPr b="1" lang="en"/>
+              <a:t>VOLU</a:t>
+            </a:r>
+            <a:r>
+              <a:rPr lang="en"/>
+              <a:t> :</a:t>
+            </a:r>
+          </a:p>
+          <a:p>
+            <a:pPr indent="-228600" lvl="1" marL="914400" rtl="0">
+              <a:lnSpc>
+                <a:spcPct val="100000"/>
+              </a:lnSpc>
+              <a:spcBef>
+                <a:spcPts val="0"/>
+              </a:spcBef>
+              <a:spcAft>
+                <a:spcPts val="1000"/>
+              </a:spcAft>
+            </a:pPr>
+            <a:r>
+              <a:rPr lang="en"/>
+              <a:t>R4out-B, Select 1, ADD-R4in,END</a:t>
+            </a:r>
+          </a:p>
+          <a:p>
+            <a:pPr indent="-228600" lvl="0" marL="457200" rtl="0">
+              <a:lnSpc>
+                <a:spcPct val="100000"/>
+              </a:lnSpc>
+              <a:spcBef>
+                <a:spcPts val="0"/>
+              </a:spcBef>
+              <a:spcAft>
+                <a:spcPts val="1000"/>
+              </a:spcAft>
+            </a:pPr>
+            <a:r>
+              <a:rPr b="1" lang="en"/>
+              <a:t>VOLL</a:t>
+            </a:r>
+            <a:r>
+              <a:rPr lang="en"/>
+              <a:t> :</a:t>
+            </a:r>
+          </a:p>
+          <a:p>
+            <a:pPr indent="-228600" lvl="1" marL="914400" rtl="0">
+              <a:lnSpc>
+                <a:spcPct val="100000"/>
+              </a:lnSpc>
+              <a:spcBef>
+                <a:spcPts val="0"/>
+              </a:spcBef>
+              <a:spcAft>
+                <a:spcPts val="1000"/>
+              </a:spcAft>
+            </a:pPr>
+            <a:r>
+              <a:rPr lang="en"/>
+              <a:t>R4out-B, Select 1, SUB-R4in,END</a:t>
+            </a:r>
+          </a:p>
+          <a:p>
+            <a:pPr indent="-228600" lvl="0" marL="457200" rtl="0">
+              <a:lnSpc>
+                <a:spcPct val="100000"/>
+              </a:lnSpc>
+              <a:spcBef>
+                <a:spcPts val="0"/>
+              </a:spcBef>
+              <a:spcAft>
+                <a:spcPts val="1000"/>
+              </a:spcAft>
+            </a:pPr>
+            <a:r>
+              <a:rPr b="1" lang="en"/>
+              <a:t>PLYD(immediate)</a:t>
+            </a:r>
+            <a:r>
+              <a:rPr lang="en"/>
+              <a:t> :</a:t>
+            </a:r>
+          </a:p>
+          <a:p>
+            <a:pPr indent="-228600" lvl="1" marL="914400" rtl="0">
+              <a:lnSpc>
+                <a:spcPct val="100000"/>
+              </a:lnSpc>
+              <a:spcBef>
+                <a:spcPts val="0"/>
+              </a:spcBef>
+              <a:spcAft>
+                <a:spcPts val="1000"/>
+              </a:spcAft>
+            </a:pPr>
+            <a:r>
+              <a:rPr lang="en"/>
+              <a:t>Immediate value_R05, MARin, Read</a:t>
+            </a:r>
+          </a:p>
+          <a:p>
+            <a:pPr indent="-228600" lvl="1" marL="914400" rtl="0">
+              <a:lnSpc>
+                <a:spcPct val="100000"/>
+              </a:lnSpc>
+              <a:spcBef>
+                <a:spcPts val="0"/>
+              </a:spcBef>
+              <a:spcAft>
+                <a:spcPts val="1000"/>
+              </a:spcAft>
+            </a:pPr>
+            <a:r>
+              <a:rPr lang="en"/>
+              <a:t>WMFC, MDRin, R00in, R00out-B, Select 1, ADD-R00in, MDRin</a:t>
+            </a:r>
+          </a:p>
+          <a:p>
+            <a:pPr indent="-228600" lvl="1" marL="914400" rtl="0">
+              <a:lnSpc>
+                <a:spcPct val="100000"/>
+              </a:lnSpc>
+              <a:spcBef>
+                <a:spcPts val="0"/>
+              </a:spcBef>
+              <a:spcAft>
+                <a:spcPts val="1000"/>
+              </a:spcAft>
+            </a:pPr>
+            <a:r>
+              <a:rPr lang="en"/>
+              <a:t>R05out, MARin, write, END</a:t>
+            </a:r>
+          </a:p>
+          <a:p>
+            <a:pPr lvl="0" rtl="0">
+              <a:lnSpc>
+                <a:spcPct val="100000"/>
+              </a:lnSpc>
+              <a:spcBef>
+                <a:spcPts val="0"/>
+              </a:spcBef>
+              <a:spcAft>
+                <a:spcPts val="1000"/>
+              </a:spcAft>
+              <a:buNone/>
+            </a:pPr>
+            <a:r>
+              <a:t/>
+            </a:r>
+            <a:endParaRPr baseline="-25000"/>
+          </a:p>
+          <a:p>
+            <a:pPr indent="0" lvl="0" marL="0" rtl="0">
+              <a:lnSpc>
+                <a:spcPct val="100000"/>
+              </a:lnSpc>
+              <a:spcBef>
+                <a:spcPts val="0"/>
+              </a:spcBef>
+              <a:spcAft>
+                <a:spcPts val="1000"/>
+              </a:spcAft>
+              <a:buNone/>
+            </a:pPr>
+            <a:r>
+              <a:t/>
+            </a:r>
+            <a:endParaRPr baseline="-25000"/>
+          </a:p>
+          <a:p>
+            <a:pPr lvl="0" rtl="0">
+              <a:lnSpc>
+                <a:spcPct val="100000"/>
+              </a:lnSpc>
+              <a:spcBef>
+                <a:spcPts val="0"/>
+              </a:spcBef>
+              <a:spcAft>
+                <a:spcPts val="1000"/>
+              </a:spcAft>
+              <a:buNone/>
+            </a:pPr>
+            <a:r>
+              <a:t/>
+            </a:r>
+            <a:endParaRPr baseline="-25000"/>
+          </a:p>
+        </p:txBody>
+      </p:sp>
+    </p:spTree>
+  </p:cSld>
+  <p:clrMapOvr>
+    <a:masterClrMapping/>
+  </p:clrMapOvr>
+</p:sld>
+</file>
+
+<file path=ppt/slides/slide16.xml><?xml version="1.0" encoding="utf-8"?>
+<p:sld xmlns:a="http://schemas.openxmlformats.org/drawingml/2006/main" xmlns:r="http://schemas.openxmlformats.org/officeDocument/2006/relationships" xmlns:mc="http://schemas.openxmlformats.org/markup-compatibility/2006" xmlns:mv="urn:schemas-microsoft-com:mac:vml" xmlns:p="http://schemas.openxmlformats.org/presentationml/2006/main" xmlns:c="http://schemas.openxmlformats.org/drawingml/2006/chart" xmlns:dgm="http://schemas.openxmlformats.org/drawingml/2006/diagram" xmlns:o="urn:schemas-microsoft-com:office:office" xmlns:v="urn:schemas-microsoft-com:vml" xmlns:pvml="urn:schemas-microsoft-com:office:powerpoint" xmlns:com="http://schemas.openxmlformats.org/drawingml/2006/compatibility" xmlns:p14="http://schemas.microsoft.com/office/powerpoint/2010/main">
+  <p:cSld>
+    <p:spTree>
+      <p:nvGrpSpPr>
+        <p:cNvPr id="177" name="Shape 177"/>
+        <p:cNvGrpSpPr/>
+        <p:nvPr/>
+      </p:nvGrpSpPr>
+      <p:grpSpPr>
+        <a:xfrm>
+          <a:off x="0" y="0"/>
+          <a:ext cx="0" cy="0"/>
+          <a:chOff x="0" y="0"/>
+          <a:chExt cx="0" cy="0"/>
+        </a:xfrm>
+      </p:grpSpPr>
+      <p:sp>
+        <p:nvSpPr>
+          <p:cNvPr id="178" name="Shape 178"/>
+          <p:cNvSpPr txBox="1"/>
+          <p:nvPr>
+            <p:ph type="title"/>
+          </p:nvPr>
+        </p:nvSpPr>
+        <p:spPr>
+          <a:xfrm>
+            <a:off x="311700" y="292850"/>
+            <a:ext cx="8520600" cy="801000"/>
+          </a:xfrm>
+          <a:prstGeom prst="rect">
+            <a:avLst/>
+          </a:prstGeom>
+        </p:spPr>
+        <p:txBody>
+          <a:bodyPr anchorCtr="0" anchor="t" bIns="91425" lIns="91425" rIns="91425" tIns="91425">
+            <a:noAutofit/>
+          </a:bodyPr>
+          <a:lstStyle/>
+          <a:p>
+            <a:pPr lvl="0" rtl="0">
+              <a:spcBef>
+                <a:spcPts val="0"/>
+              </a:spcBef>
+              <a:buNone/>
+            </a:pPr>
+            <a:r>
+              <a:rPr lang="en"/>
+              <a:t>Micro Routines</a:t>
+            </a:r>
+          </a:p>
+        </p:txBody>
+      </p:sp>
+      <p:sp>
+        <p:nvSpPr>
+          <p:cNvPr id="179" name="Shape 179"/>
+          <p:cNvSpPr txBox="1"/>
+          <p:nvPr>
+            <p:ph idx="1" type="body"/>
+          </p:nvPr>
+        </p:nvSpPr>
+        <p:spPr>
+          <a:xfrm>
+            <a:off x="271050" y="1242225"/>
+            <a:ext cx="8520600" cy="3340200"/>
+          </a:xfrm>
+          <a:prstGeom prst="rect">
+            <a:avLst/>
+          </a:prstGeom>
+        </p:spPr>
+        <p:txBody>
+          <a:bodyPr anchorCtr="0" anchor="t" bIns="91425" lIns="91425" rIns="91425" tIns="91425">
+            <a:noAutofit/>
+          </a:bodyPr>
+          <a:lstStyle/>
+          <a:p>
+            <a:pPr indent="-228600" lvl="0" marL="457200" rtl="0">
+              <a:lnSpc>
+                <a:spcPct val="100000"/>
+              </a:lnSpc>
+              <a:spcBef>
+                <a:spcPts val="0"/>
+              </a:spcBef>
+              <a:spcAft>
+                <a:spcPts val="1000"/>
+              </a:spcAft>
+            </a:pPr>
+            <a:r>
+              <a:rPr b="1" lang="en"/>
+              <a:t>PLYR</a:t>
+            </a:r>
+            <a:r>
+              <a:rPr lang="en"/>
+              <a:t> (Play current Song):</a:t>
+            </a:r>
+          </a:p>
+          <a:p>
+            <a:pPr indent="-228600" lvl="1" marL="914400" rtl="0">
+              <a:lnSpc>
+                <a:spcPct val="100000"/>
+              </a:lnSpc>
+              <a:spcBef>
+                <a:spcPts val="0"/>
+              </a:spcBef>
+              <a:spcAft>
+                <a:spcPts val="1000"/>
+              </a:spcAft>
+            </a:pPr>
+            <a:r>
+              <a:rPr lang="en"/>
+              <a:t>R05out, MARin, Read</a:t>
+            </a:r>
+          </a:p>
+          <a:p>
+            <a:pPr indent="-228600" lvl="1" marL="914400" rtl="0">
+              <a:lnSpc>
+                <a:spcPct val="100000"/>
+              </a:lnSpc>
+              <a:spcBef>
+                <a:spcPts val="0"/>
+              </a:spcBef>
+              <a:spcAft>
+                <a:spcPts val="1000"/>
+              </a:spcAft>
+            </a:pPr>
+            <a:r>
+              <a:rPr lang="en"/>
+              <a:t>WMFC, MDRin, R00in, Select 1, ADD-R00out, MDRin</a:t>
+            </a:r>
+          </a:p>
+          <a:p>
+            <a:pPr indent="-228600" lvl="1" marL="914400" rtl="0">
+              <a:lnSpc>
+                <a:spcPct val="100000"/>
+              </a:lnSpc>
+              <a:spcBef>
+                <a:spcPts val="0"/>
+              </a:spcBef>
+              <a:spcAft>
+                <a:spcPts val="1000"/>
+              </a:spcAft>
+            </a:pPr>
+            <a:r>
+              <a:rPr lang="en"/>
+              <a:t>R05out-B, MARin, write, END</a:t>
+            </a:r>
+          </a:p>
+          <a:p>
+            <a:pPr indent="-228600" lvl="0" marL="457200" rtl="0">
+              <a:lnSpc>
+                <a:spcPct val="100000"/>
+              </a:lnSpc>
+              <a:spcBef>
+                <a:spcPts val="0"/>
+              </a:spcBef>
+              <a:spcAft>
+                <a:spcPts val="1000"/>
+              </a:spcAft>
+            </a:pPr>
+            <a:r>
+              <a:rPr b="1" lang="en"/>
+              <a:t>LPD</a:t>
+            </a:r>
+          </a:p>
+          <a:p>
+            <a:pPr indent="-228600" lvl="1" marL="914400" rtl="0">
+              <a:lnSpc>
+                <a:spcPct val="100000"/>
+              </a:lnSpc>
+              <a:spcBef>
+                <a:spcPts val="0"/>
+              </a:spcBef>
+              <a:spcAft>
+                <a:spcPts val="1000"/>
+              </a:spcAft>
+            </a:pPr>
+            <a:r>
+              <a:rPr lang="en"/>
+              <a:t>Immediate value_R05, MARin, Read, Set Loop flag  </a:t>
+            </a:r>
+          </a:p>
+          <a:p>
+            <a:pPr indent="-228600" lvl="1" marL="914400" rtl="0">
+              <a:lnSpc>
+                <a:spcPct val="100000"/>
+              </a:lnSpc>
+              <a:spcBef>
+                <a:spcPts val="0"/>
+              </a:spcBef>
+              <a:spcAft>
+                <a:spcPts val="1000"/>
+              </a:spcAft>
+            </a:pPr>
+            <a:r>
+              <a:rPr lang="en"/>
+              <a:t>WMFC</a:t>
+            </a:r>
+          </a:p>
+          <a:p>
+            <a:pPr indent="-228600" lvl="1" marL="914400" rtl="0">
+              <a:lnSpc>
+                <a:spcPct val="100000"/>
+              </a:lnSpc>
+              <a:spcBef>
+                <a:spcPts val="0"/>
+              </a:spcBef>
+              <a:spcAft>
+                <a:spcPts val="1000"/>
+              </a:spcAft>
+            </a:pPr>
+            <a:r>
+              <a:rPr lang="en"/>
+              <a:t>MDRin, R00in</a:t>
+            </a:r>
+          </a:p>
+          <a:p>
+            <a:pPr indent="-228600" lvl="1" marL="914400" rtl="0">
+              <a:lnSpc>
+                <a:spcPct val="100000"/>
+              </a:lnSpc>
+              <a:spcBef>
+                <a:spcPts val="0"/>
+              </a:spcBef>
+              <a:spcAft>
+                <a:spcPts val="1000"/>
+              </a:spcAft>
+            </a:pPr>
+            <a:r>
+              <a:rPr lang="en"/>
+              <a:t>R00out-A, R01out-B, Select A, ADD-R00in, MDRin</a:t>
+            </a:r>
+          </a:p>
+          <a:p>
+            <a:pPr indent="-228600" lvl="1" marL="914400" rtl="0">
+              <a:lnSpc>
+                <a:spcPct val="100000"/>
+              </a:lnSpc>
+              <a:spcBef>
+                <a:spcPts val="0"/>
+              </a:spcBef>
+              <a:spcAft>
+                <a:spcPts val="1000"/>
+              </a:spcAft>
+            </a:pPr>
+            <a:r>
+              <a:rPr lang="en"/>
+              <a:t>R05out, MARin, write, END</a:t>
+            </a:r>
+          </a:p>
+          <a:p>
+            <a:pPr indent="-228600" lvl="0" marL="457200" rtl="0">
+              <a:lnSpc>
+                <a:spcPct val="100000"/>
+              </a:lnSpc>
+              <a:spcBef>
+                <a:spcPts val="0"/>
+              </a:spcBef>
+              <a:spcAft>
+                <a:spcPts val="1000"/>
+              </a:spcAft>
+            </a:pPr>
+            <a:r>
+              <a:rPr b="1" lang="en"/>
+              <a:t>REWD</a:t>
+            </a:r>
+            <a:r>
+              <a:rPr lang="en"/>
+              <a:t> :</a:t>
+            </a:r>
+          </a:p>
+          <a:p>
+            <a:pPr indent="-228600" lvl="1" marL="914400" rtl="0">
+              <a:lnSpc>
+                <a:spcPct val="100000"/>
+              </a:lnSpc>
+              <a:spcBef>
+                <a:spcPts val="0"/>
+              </a:spcBef>
+              <a:spcAft>
+                <a:spcPts val="1000"/>
+              </a:spcAft>
+            </a:pPr>
+            <a:r>
+              <a:rPr lang="en"/>
+              <a:t>Immediate value_R03,END</a:t>
+            </a:r>
+          </a:p>
+          <a:p>
+            <a:pPr lvl="0" rtl="0">
+              <a:lnSpc>
+                <a:spcPct val="100000"/>
+              </a:lnSpc>
+              <a:spcBef>
+                <a:spcPts val="0"/>
+              </a:spcBef>
+              <a:spcAft>
+                <a:spcPts val="1000"/>
+              </a:spcAft>
+              <a:buNone/>
+            </a:pPr>
+            <a:r>
+              <a:t/>
+            </a:r>
+            <a:endParaRPr baseline="-25000"/>
+          </a:p>
+          <a:p>
+            <a:pPr indent="0" lvl="0" marL="0" rtl="0">
+              <a:lnSpc>
+                <a:spcPct val="100000"/>
+              </a:lnSpc>
+              <a:spcBef>
+                <a:spcPts val="0"/>
+              </a:spcBef>
+              <a:spcAft>
+                <a:spcPts val="1000"/>
+              </a:spcAft>
+              <a:buNone/>
+            </a:pPr>
+            <a:r>
+              <a:t/>
+            </a:r>
+            <a:endParaRPr baseline="-25000"/>
+          </a:p>
+          <a:p>
+            <a:pPr lvl="0" rtl="0">
+              <a:lnSpc>
+                <a:spcPct val="100000"/>
+              </a:lnSpc>
+              <a:spcBef>
+                <a:spcPts val="0"/>
+              </a:spcBef>
+              <a:spcAft>
+                <a:spcPts val="1000"/>
+              </a:spcAft>
+              <a:buNone/>
+            </a:pPr>
+            <a:r>
+              <a:t/>
+            </a:r>
+            <a:endParaRPr baseline="-25000"/>
+          </a:p>
+        </p:txBody>
+      </p:sp>
+    </p:spTree>
+  </p:cSld>
+  <p:clrMapOvr>
+    <a:masterClrMapping/>
+  </p:clrMapOvr>
+</p:sld>
+</file>
+
+<file path=ppt/slides/slide17.xml><?xml version="1.0" encoding="utf-8"?>
+<p:sld xmlns:a="http://schemas.openxmlformats.org/drawingml/2006/main" xmlns:r="http://schemas.openxmlformats.org/officeDocument/2006/relationships" xmlns:mc="http://schemas.openxmlformats.org/markup-compatibility/2006" xmlns:mv="urn:schemas-microsoft-com:mac:vml" xmlns:p="http://schemas.openxmlformats.org/presentationml/2006/main" xmlns:c="http://schemas.openxmlformats.org/drawingml/2006/chart" xmlns:dgm="http://schemas.openxmlformats.org/drawingml/2006/diagram" xmlns:o="urn:schemas-microsoft-com:office:office" xmlns:v="urn:schemas-microsoft-com:vml" xmlns:pvml="urn:schemas-microsoft-com:office:powerpoint" xmlns:com="http://schemas.openxmlformats.org/drawingml/2006/compatibility" xmlns:p14="http://schemas.microsoft.com/office/powerpoint/2010/main">
+  <p:cSld>
+    <p:spTree>
+      <p:nvGrpSpPr>
+        <p:cNvPr id="183" name="Shape 183"/>
+        <p:cNvGrpSpPr/>
+        <p:nvPr/>
+      </p:nvGrpSpPr>
+      <p:grpSpPr>
+        <a:xfrm>
+          <a:off x="0" y="0"/>
+          <a:ext cx="0" cy="0"/>
+          <a:chOff x="0" y="0"/>
+          <a:chExt cx="0" cy="0"/>
+        </a:xfrm>
+      </p:grpSpPr>
+      <p:sp>
+        <p:nvSpPr>
+          <p:cNvPr id="184" name="Shape 184"/>
+          <p:cNvSpPr txBox="1"/>
+          <p:nvPr>
+            <p:ph type="title"/>
+          </p:nvPr>
+        </p:nvSpPr>
+        <p:spPr>
+          <a:xfrm>
+            <a:off x="311700" y="292850"/>
+            <a:ext cx="8520600" cy="801000"/>
+          </a:xfrm>
+          <a:prstGeom prst="rect">
+            <a:avLst/>
+          </a:prstGeom>
+        </p:spPr>
+        <p:txBody>
+          <a:bodyPr anchorCtr="0" anchor="t" bIns="91425" lIns="91425" rIns="91425" tIns="91425">
+            <a:noAutofit/>
+          </a:bodyPr>
+          <a:lstStyle/>
+          <a:p>
+            <a:pPr lvl="0" rtl="0">
+              <a:spcBef>
+                <a:spcPts val="0"/>
+              </a:spcBef>
+              <a:buNone/>
+            </a:pPr>
+            <a:r>
+              <a:rPr lang="en"/>
+              <a:t>Micro Routines</a:t>
+            </a:r>
+          </a:p>
+        </p:txBody>
+      </p:sp>
+      <p:sp>
+        <p:nvSpPr>
+          <p:cNvPr id="185" name="Shape 185"/>
+          <p:cNvSpPr txBox="1"/>
+          <p:nvPr>
+            <p:ph idx="1" type="body"/>
+          </p:nvPr>
+        </p:nvSpPr>
+        <p:spPr>
+          <a:xfrm>
+            <a:off x="271050" y="1242225"/>
+            <a:ext cx="8520600" cy="3340200"/>
+          </a:xfrm>
+          <a:prstGeom prst="rect">
+            <a:avLst/>
+          </a:prstGeom>
+        </p:spPr>
+        <p:txBody>
+          <a:bodyPr anchorCtr="0" anchor="t" bIns="91425" lIns="91425" rIns="91425" tIns="91425">
+            <a:noAutofit/>
+          </a:bodyPr>
+          <a:lstStyle/>
+          <a:p>
+            <a:pPr indent="-228600" lvl="0" marL="457200" rtl="0">
+              <a:lnSpc>
+                <a:spcPct val="100000"/>
+              </a:lnSpc>
+              <a:spcBef>
+                <a:spcPts val="0"/>
+              </a:spcBef>
+              <a:spcAft>
+                <a:spcPts val="1000"/>
+              </a:spcAft>
+            </a:pPr>
+            <a:r>
+              <a:rPr b="1" lang="en"/>
+              <a:t>ADS</a:t>
+            </a:r>
+            <a:r>
+              <a:rPr b="1" lang="en"/>
+              <a:t>D</a:t>
+            </a:r>
+            <a:r>
+              <a:rPr lang="en"/>
+              <a:t> :</a:t>
+            </a:r>
+          </a:p>
+          <a:p>
+            <a:pPr indent="-228600" lvl="1" marL="914400" rtl="0">
+              <a:lnSpc>
+                <a:spcPct val="100000"/>
+              </a:lnSpc>
+              <a:spcBef>
+                <a:spcPts val="0"/>
+              </a:spcBef>
+              <a:spcAft>
+                <a:spcPts val="1000"/>
+              </a:spcAft>
+            </a:pPr>
+            <a:r>
+              <a:rPr lang="en"/>
+              <a:t>R07out-A,R00out-B,select A, ADD, R07in</a:t>
+            </a:r>
+          </a:p>
+          <a:p>
+            <a:pPr indent="-228600" lvl="1" marL="914400" rtl="0">
+              <a:lnSpc>
+                <a:spcPct val="100000"/>
+              </a:lnSpc>
+              <a:spcBef>
+                <a:spcPts val="0"/>
+              </a:spcBef>
+              <a:spcAft>
+                <a:spcPts val="1000"/>
+              </a:spcAft>
+            </a:pPr>
+            <a:r>
+              <a:rPr lang="en"/>
+              <a:t>Select 8, R07out-A, SUB,R00in,CMP</a:t>
+            </a:r>
+          </a:p>
+          <a:p>
+            <a:pPr indent="-228600" lvl="1" marL="914400" rtl="0">
+              <a:lnSpc>
+                <a:spcPct val="100000"/>
+              </a:lnSpc>
+              <a:spcBef>
+                <a:spcPts val="0"/>
+              </a:spcBef>
+              <a:spcAft>
+                <a:spcPts val="1000"/>
+              </a:spcAft>
+            </a:pPr>
+            <a:r>
+              <a:rPr lang="en"/>
+              <a:t>if(R00=0 Z=1,R00&lt;0 N=1,R00&gt;0 No Flag),END</a:t>
+            </a:r>
+          </a:p>
+          <a:p>
+            <a:pPr indent="-228600" lvl="0" marL="457200" rtl="0">
+              <a:lnSpc>
+                <a:spcPct val="100000"/>
+              </a:lnSpc>
+              <a:spcBef>
+                <a:spcPts val="0"/>
+              </a:spcBef>
+              <a:spcAft>
+                <a:spcPts val="1000"/>
+              </a:spcAft>
+            </a:pPr>
+            <a:r>
+              <a:rPr b="1" lang="en"/>
+              <a:t>SFL</a:t>
+            </a:r>
+            <a:r>
+              <a:rPr lang="en"/>
+              <a:t> :</a:t>
+            </a:r>
+          </a:p>
+          <a:p>
+            <a:pPr indent="-228600" lvl="1" marL="914400" rtl="0">
+              <a:lnSpc>
+                <a:spcPct val="100000"/>
+              </a:lnSpc>
+              <a:spcBef>
+                <a:spcPts val="0"/>
+              </a:spcBef>
+              <a:spcAft>
+                <a:spcPts val="1000"/>
+              </a:spcAft>
+            </a:pPr>
+            <a:r>
+              <a:rPr lang="en"/>
+              <a:t>R07out-A,R05out-B, Select A, ADD, R00in</a:t>
+            </a:r>
+          </a:p>
+          <a:p>
+            <a:pPr indent="-228600" lvl="1" marL="914400" rtl="0">
+              <a:lnSpc>
+                <a:spcPct val="100000"/>
+              </a:lnSpc>
+              <a:spcBef>
+                <a:spcPts val="0"/>
+              </a:spcBef>
+              <a:spcAft>
+                <a:spcPts val="1000"/>
+              </a:spcAft>
+            </a:pPr>
+            <a:r>
+              <a:rPr lang="en"/>
+              <a:t>R00out-A,R07out-B,Select A, MOD,R05in,END</a:t>
+            </a:r>
+          </a:p>
+          <a:p>
+            <a:pPr indent="-228600" lvl="0" marL="457200" rtl="0">
+              <a:lnSpc>
+                <a:spcPct val="100000"/>
+              </a:lnSpc>
+              <a:spcBef>
+                <a:spcPts val="0"/>
+              </a:spcBef>
+              <a:spcAft>
+                <a:spcPts val="1000"/>
+              </a:spcAft>
+            </a:pPr>
+            <a:r>
+              <a:rPr b="1" lang="en"/>
+              <a:t>MPS</a:t>
+            </a:r>
+            <a:r>
+              <a:rPr lang="en"/>
+              <a:t> :</a:t>
+            </a:r>
+          </a:p>
+          <a:p>
+            <a:pPr indent="-228600" lvl="1" marL="914400" rtl="0">
+              <a:lnSpc>
+                <a:spcPct val="100000"/>
+              </a:lnSpc>
+              <a:spcBef>
+                <a:spcPts val="0"/>
+              </a:spcBef>
+              <a:spcAft>
+                <a:spcPts val="1000"/>
+              </a:spcAft>
+            </a:pPr>
+            <a:r>
+              <a:rPr lang="en"/>
+              <a:t>R00 out-A, MARin,Read</a:t>
+            </a:r>
+          </a:p>
+          <a:p>
+            <a:pPr indent="-228600" lvl="1" marL="914400" rtl="0">
+              <a:lnSpc>
+                <a:spcPct val="100000"/>
+              </a:lnSpc>
+              <a:spcBef>
+                <a:spcPts val="0"/>
+              </a:spcBef>
+              <a:spcAft>
+                <a:spcPts val="1000"/>
+              </a:spcAft>
+            </a:pPr>
+            <a:r>
+              <a:rPr lang="en"/>
+              <a:t>WMFC, MDRout-B,R=B,R01in,LOOP Until it becomes equal to R07</a:t>
+            </a:r>
+          </a:p>
+          <a:p>
+            <a:pPr indent="-228600" lvl="1" marL="914400" rtl="0">
+              <a:lnSpc>
+                <a:spcPct val="100000"/>
+              </a:lnSpc>
+              <a:spcBef>
+                <a:spcPts val="0"/>
+              </a:spcBef>
+              <a:spcAft>
+                <a:spcPts val="1000"/>
+              </a:spcAft>
+            </a:pPr>
+            <a:r>
+              <a:rPr lang="en"/>
+              <a:t>Now we will compare different value of count by Storing in R01,R02 and using the CMP function and store the maximum among them in R00.</a:t>
+            </a:r>
+          </a:p>
+          <a:p>
+            <a:pPr lvl="0" rtl="0">
+              <a:lnSpc>
+                <a:spcPct val="100000"/>
+              </a:lnSpc>
+              <a:spcBef>
+                <a:spcPts val="0"/>
+              </a:spcBef>
+              <a:spcAft>
+                <a:spcPts val="1000"/>
+              </a:spcAft>
+              <a:buNone/>
+            </a:pPr>
+            <a:r>
+              <a:t/>
+            </a:r>
+            <a:endParaRPr baseline="-25000"/>
+          </a:p>
+          <a:p>
+            <a:pPr indent="0" lvl="0" marL="457200" rtl="0">
+              <a:lnSpc>
+                <a:spcPct val="100000"/>
+              </a:lnSpc>
+              <a:spcBef>
+                <a:spcPts val="0"/>
+              </a:spcBef>
+              <a:spcAft>
+                <a:spcPts val="1000"/>
+              </a:spcAft>
+              <a:buNone/>
+            </a:pPr>
+            <a:r>
+              <a:t/>
+            </a:r>
+            <a:endParaRPr/>
+          </a:p>
+          <a:p>
+            <a:pPr lvl="0" rtl="0">
+              <a:lnSpc>
+                <a:spcPct val="100000"/>
+              </a:lnSpc>
+              <a:spcBef>
+                <a:spcPts val="0"/>
+              </a:spcBef>
+              <a:spcAft>
+                <a:spcPts val="1000"/>
+              </a:spcAft>
+              <a:buNone/>
+            </a:pPr>
+            <a:r>
+              <a:t/>
+            </a:r>
+            <a:endParaRPr baseline="-25000"/>
+          </a:p>
+          <a:p>
+            <a:pPr indent="0" lvl="0" marL="457200" rtl="0">
+              <a:lnSpc>
+                <a:spcPct val="100000"/>
+              </a:lnSpc>
+              <a:spcBef>
+                <a:spcPts val="0"/>
+              </a:spcBef>
+              <a:spcAft>
+                <a:spcPts val="1000"/>
+              </a:spcAft>
+              <a:buNone/>
+            </a:pPr>
+            <a:r>
+              <a:t/>
+            </a:r>
+            <a:endParaRPr/>
+          </a:p>
+          <a:p>
+            <a:pPr lvl="0" rtl="0">
+              <a:lnSpc>
+                <a:spcPct val="100000"/>
+              </a:lnSpc>
+              <a:spcBef>
+                <a:spcPts val="0"/>
+              </a:spcBef>
+              <a:spcAft>
+                <a:spcPts val="1000"/>
+              </a:spcAft>
+              <a:buNone/>
+            </a:pPr>
+            <a:r>
+              <a:t/>
+            </a:r>
+            <a:endParaRPr baseline="-25000"/>
+          </a:p>
+        </p:txBody>
+      </p:sp>
+    </p:spTree>
+  </p:cSld>
+  <p:clrMapOvr>
+    <a:masterClrMapping/>
+  </p:clrMapOvr>
+</p:sld>
+</file>
+
+<file path=ppt/slides/slide18.xml><?xml version="1.0" encoding="utf-8"?>
+<p:sld xmlns:a="http://schemas.openxmlformats.org/drawingml/2006/main" xmlns:r="http://schemas.openxmlformats.org/officeDocument/2006/relationships" xmlns:mc="http://schemas.openxmlformats.org/markup-compatibility/2006" xmlns:mv="urn:schemas-microsoft-com:mac:vml" xmlns:p="http://schemas.openxmlformats.org/presentationml/2006/main" xmlns:c="http://schemas.openxmlformats.org/drawingml/2006/chart" xmlns:dgm="http://schemas.openxmlformats.org/drawingml/2006/diagram" xmlns:o="urn:schemas-microsoft-com:office:office" xmlns:v="urn:schemas-microsoft-com:vml" xmlns:pvml="urn:schemas-microsoft-com:office:powerpoint" xmlns:com="http://schemas.openxmlformats.org/drawingml/2006/compatibility" xmlns:p14="http://schemas.microsoft.com/office/powerpoint/2010/main">
+  <p:cSld>
+    <p:spTree>
+      <p:nvGrpSpPr>
+        <p:cNvPr id="189" name="Shape 189"/>
+        <p:cNvGrpSpPr/>
+        <p:nvPr/>
+      </p:nvGrpSpPr>
+      <p:grpSpPr>
+        <a:xfrm>
+          <a:off x="0" y="0"/>
+          <a:ext cx="0" cy="0"/>
+          <a:chOff x="0" y="0"/>
+          <a:chExt cx="0" cy="0"/>
+        </a:xfrm>
+      </p:grpSpPr>
+      <p:sp>
+        <p:nvSpPr>
+          <p:cNvPr id="190" name="Shape 190"/>
+          <p:cNvSpPr txBox="1"/>
+          <p:nvPr>
+            <p:ph type="title"/>
+          </p:nvPr>
+        </p:nvSpPr>
+        <p:spPr>
+          <a:xfrm>
+            <a:off x="311700" y="292850"/>
+            <a:ext cx="8520600" cy="801000"/>
+          </a:xfrm>
+          <a:prstGeom prst="rect">
+            <a:avLst/>
+          </a:prstGeom>
+        </p:spPr>
+        <p:txBody>
+          <a:bodyPr anchorCtr="0" anchor="t" bIns="91425" lIns="91425" rIns="91425" tIns="91425">
+            <a:noAutofit/>
+          </a:bodyPr>
+          <a:lstStyle/>
+          <a:p>
+            <a:pPr lvl="0">
+              <a:spcBef>
+                <a:spcPts val="0"/>
+              </a:spcBef>
+              <a:buNone/>
+            </a:pPr>
+            <a:r>
+              <a:rPr lang="en"/>
+              <a:t>Control Word</a:t>
+            </a:r>
+          </a:p>
+        </p:txBody>
+      </p:sp>
+      <p:sp>
+        <p:nvSpPr>
+          <p:cNvPr id="191" name="Shape 191"/>
+          <p:cNvSpPr txBox="1"/>
+          <p:nvPr>
+            <p:ph idx="1" type="body"/>
+          </p:nvPr>
+        </p:nvSpPr>
+        <p:spPr>
+          <a:xfrm>
+            <a:off x="311700" y="1228675"/>
+            <a:ext cx="8520600" cy="3340200"/>
+          </a:xfrm>
+          <a:prstGeom prst="rect">
+            <a:avLst/>
+          </a:prstGeom>
+        </p:spPr>
+        <p:txBody>
+          <a:bodyPr anchorCtr="0" anchor="t" bIns="91425" lIns="91425" rIns="91425" tIns="91425">
+            <a:noAutofit/>
+          </a:bodyPr>
+          <a:lstStyle/>
+          <a:p>
+            <a:pPr lvl="0">
+              <a:spcBef>
+                <a:spcPts val="0"/>
+              </a:spcBef>
+              <a:buNone/>
+            </a:pPr>
+            <a:r>
+              <a:rPr lang="en"/>
+              <a:t>We will be using Vertical </a:t>
+            </a:r>
+            <a:r>
+              <a:rPr lang="en"/>
+              <a:t>Positioning.</a:t>
+            </a:r>
+          </a:p>
+          <a:p>
+            <a:pPr lvl="0">
+              <a:spcBef>
+                <a:spcPts val="0"/>
+              </a:spcBef>
+              <a:buNone/>
+            </a:pPr>
+            <a:r>
+              <a:rPr lang="en"/>
+              <a:t>F0: (8 bits) Address of Next micro-instruction.</a:t>
+            </a:r>
+          </a:p>
+          <a:p>
+            <a:pPr lvl="0">
+              <a:spcBef>
+                <a:spcPts val="0"/>
+              </a:spcBef>
+              <a:buNone/>
+            </a:pPr>
+            <a:r>
+              <a:rPr lang="en"/>
+              <a:t>F1: (4 bits) 0000-Offset,0001-PCout,0010-MDR(out),0011-Zout,1000 R00in,....1111-R07in</a:t>
+            </a:r>
+          </a:p>
+          <a:p>
+            <a:pPr lvl="0">
+              <a:spcBef>
+                <a:spcPts val="0"/>
+              </a:spcBef>
+              <a:buNone/>
+            </a:pPr>
+            <a:r>
+              <a:rPr lang="en"/>
+              <a:t>F2: (4 bits) 0001-PCin,0010-IRin,0011-IRout,1000-R00out…..1111-R07out.</a:t>
+            </a:r>
+          </a:p>
+        </p:txBody>
+      </p:sp>
+    </p:spTree>
+  </p:cSld>
+  <p:clrMapOvr>
+    <a:masterClrMapping/>
+  </p:clrMapOvr>
+</p:sld>
+</file>
+
+<file path=ppt/slides/slide19.xml><?xml version="1.0" encoding="utf-8"?>
+<p:sld xmlns:a="http://schemas.openxmlformats.org/drawingml/2006/main" xmlns:r="http://schemas.openxmlformats.org/officeDocument/2006/relationships" xmlns:mc="http://schemas.openxmlformats.org/markup-compatibility/2006" xmlns:mv="urn:schemas-microsoft-com:mac:vml" xmlns:p="http://schemas.openxmlformats.org/presentationml/2006/main" xmlns:c="http://schemas.openxmlformats.org/drawingml/2006/chart" xmlns:dgm="http://schemas.openxmlformats.org/drawingml/2006/diagram" xmlns:o="urn:schemas-microsoft-com:office:office" xmlns:v="urn:schemas-microsoft-com:vml" xmlns:pvml="urn:schemas-microsoft-com:office:powerpoint" xmlns:com="http://schemas.openxmlformats.org/drawingml/2006/compatibility" xmlns:p14="http://schemas.microsoft.com/office/powerpoint/2010/main">
+  <p:cSld>
+    <p:spTree>
+      <p:nvGrpSpPr>
+        <p:cNvPr id="195" name="Shape 195"/>
+        <p:cNvGrpSpPr/>
+        <p:nvPr/>
+      </p:nvGrpSpPr>
+      <p:grpSpPr>
+        <a:xfrm>
+          <a:off x="0" y="0"/>
+          <a:ext cx="0" cy="0"/>
+          <a:chOff x="0" y="0"/>
+          <a:chExt cx="0" cy="0"/>
+        </a:xfrm>
+      </p:grpSpPr>
+      <p:sp>
+        <p:nvSpPr>
+          <p:cNvPr id="196" name="Shape 196"/>
+          <p:cNvSpPr txBox="1"/>
+          <p:nvPr>
+            <p:ph type="title"/>
+          </p:nvPr>
+        </p:nvSpPr>
+        <p:spPr>
+          <a:xfrm>
+            <a:off x="311700" y="292850"/>
+            <a:ext cx="8520600" cy="801000"/>
+          </a:xfrm>
+          <a:prstGeom prst="rect">
+            <a:avLst/>
+          </a:prstGeom>
+        </p:spPr>
+        <p:txBody>
+          <a:bodyPr anchorCtr="0" anchor="t" bIns="91425" lIns="91425" rIns="91425" tIns="91425">
+            <a:noAutofit/>
+          </a:bodyPr>
+          <a:lstStyle/>
+          <a:p>
+            <a:pPr lvl="0">
+              <a:spcBef>
+                <a:spcPts val="0"/>
+              </a:spcBef>
+              <a:buNone/>
+            </a:pPr>
+            <a:r>
+              <a:rPr lang="en"/>
+              <a:t>Control word</a:t>
+            </a:r>
+          </a:p>
+        </p:txBody>
+      </p:sp>
+      <p:sp>
+        <p:nvSpPr>
+          <p:cNvPr id="197" name="Shape 197"/>
+          <p:cNvSpPr txBox="1"/>
+          <p:nvPr>
+            <p:ph idx="1" type="body"/>
+          </p:nvPr>
+        </p:nvSpPr>
+        <p:spPr>
+          <a:xfrm>
+            <a:off x="311700" y="1228675"/>
+            <a:ext cx="8520600" cy="3340200"/>
+          </a:xfrm>
+          <a:prstGeom prst="rect">
+            <a:avLst/>
+          </a:prstGeom>
+        </p:spPr>
+        <p:txBody>
+          <a:bodyPr anchorCtr="0" anchor="t" bIns="91425" lIns="91425" rIns="91425" tIns="91425">
+            <a:noAutofit/>
+          </a:bodyPr>
+          <a:lstStyle/>
+          <a:p>
+            <a:pPr lvl="0">
+              <a:spcBef>
+                <a:spcPts val="0"/>
+              </a:spcBef>
+              <a:buNone/>
+            </a:pPr>
+            <a:r>
+              <a:rPr lang="en"/>
+              <a:t>F3: (2 Bits) 01-MARin,10-MDRin,11-Yin</a:t>
+            </a:r>
+          </a:p>
+          <a:p>
+            <a:pPr lvl="0">
+              <a:spcBef>
+                <a:spcPts val="0"/>
+              </a:spcBef>
+              <a:buNone/>
+            </a:pPr>
+            <a:r>
+              <a:rPr lang="en"/>
+              <a:t>F4: (3 Bits) 000-ADD,001-SUB,010-CMP,011-AND,100-OR</a:t>
+            </a:r>
+          </a:p>
+          <a:p>
+            <a:pPr lvl="0">
+              <a:spcBef>
+                <a:spcPts val="0"/>
+              </a:spcBef>
+              <a:buNone/>
+            </a:pPr>
+            <a:r>
+              <a:rPr lang="en"/>
+              <a:t>F5: (2 bits) 00-No action,01-Read,10-Write.</a:t>
+            </a:r>
+          </a:p>
+          <a:p>
+            <a:pPr lvl="0">
+              <a:spcBef>
+                <a:spcPts val="0"/>
+              </a:spcBef>
+              <a:buNone/>
+            </a:pPr>
+            <a:r>
+              <a:rPr lang="en"/>
+              <a:t>F6: (2 Bits) 00-Select Y,10-Select 8,11-Select 1</a:t>
+            </a:r>
+          </a:p>
+          <a:p>
+            <a:pPr lvl="0">
+              <a:spcBef>
+                <a:spcPts val="0"/>
+              </a:spcBef>
+              <a:buNone/>
+            </a:pPr>
+            <a:r>
+              <a:rPr lang="en"/>
+              <a:t>F7: (1 Bit) 0-No action, 1-WMFC</a:t>
+            </a:r>
+          </a:p>
+          <a:p>
+            <a:pPr lvl="0">
+              <a:spcBef>
+                <a:spcPts val="0"/>
+              </a:spcBef>
+              <a:buNone/>
+            </a:pPr>
+            <a:r>
+              <a:rPr lang="en"/>
+              <a:t>F8: (1 Bit) 0-Continue, 1-End</a:t>
             </a:r>
           </a:p>
         </p:txBody>
@@ -6306,6 +10017,184 @@
 </p:sld>
 </file>
 
+<file path=ppt/slides/slide20.xml><?xml version="1.0" encoding="utf-8"?>
+<p:sld xmlns:a="http://schemas.openxmlformats.org/drawingml/2006/main" xmlns:r="http://schemas.openxmlformats.org/officeDocument/2006/relationships" xmlns:mc="http://schemas.openxmlformats.org/markup-compatibility/2006" xmlns:mv="urn:schemas-microsoft-com:mac:vml" xmlns:p="http://schemas.openxmlformats.org/presentationml/2006/main" xmlns:c="http://schemas.openxmlformats.org/drawingml/2006/chart" xmlns:dgm="http://schemas.openxmlformats.org/drawingml/2006/diagram" xmlns:o="urn:schemas-microsoft-com:office:office" xmlns:v="urn:schemas-microsoft-com:vml" xmlns:pvml="urn:schemas-microsoft-com:office:powerpoint" xmlns:com="http://schemas.openxmlformats.org/drawingml/2006/compatibility" xmlns:p14="http://schemas.microsoft.com/office/powerpoint/2010/main">
+  <p:cSld>
+    <p:spTree>
+      <p:nvGrpSpPr>
+        <p:cNvPr id="201" name="Shape 201"/>
+        <p:cNvGrpSpPr/>
+        <p:nvPr/>
+      </p:nvGrpSpPr>
+      <p:grpSpPr>
+        <a:xfrm>
+          <a:off x="0" y="0"/>
+          <a:ext cx="0" cy="0"/>
+          <a:chOff x="0" y="0"/>
+          <a:chExt cx="0" cy="0"/>
+        </a:xfrm>
+      </p:grpSpPr>
+      <p:sp>
+        <p:nvSpPr>
+          <p:cNvPr id="202" name="Shape 202"/>
+          <p:cNvSpPr txBox="1"/>
+          <p:nvPr>
+            <p:ph type="title"/>
+          </p:nvPr>
+        </p:nvSpPr>
+        <p:spPr>
+          <a:xfrm>
+            <a:off x="311700" y="292850"/>
+            <a:ext cx="8520600" cy="801000"/>
+          </a:xfrm>
+          <a:prstGeom prst="rect">
+            <a:avLst/>
+          </a:prstGeom>
+        </p:spPr>
+        <p:txBody>
+          <a:bodyPr anchorCtr="0" anchor="t" bIns="91425" lIns="91425" rIns="91425" tIns="91425">
+            <a:noAutofit/>
+          </a:bodyPr>
+          <a:lstStyle/>
+          <a:p>
+            <a:pPr lvl="0">
+              <a:spcBef>
+                <a:spcPts val="0"/>
+              </a:spcBef>
+              <a:buNone/>
+            </a:pPr>
+            <a:r>
+              <a:rPr lang="en"/>
+              <a:t>Control Unit</a:t>
+            </a:r>
+          </a:p>
+        </p:txBody>
+      </p:sp>
+      <p:pic>
+        <p:nvPicPr>
+          <p:cNvPr id="203" name="Shape 203"/>
+          <p:cNvPicPr preferRelativeResize="0"/>
+          <p:nvPr/>
+        </p:nvPicPr>
+        <p:blipFill>
+          <a:blip r:embed="rId3">
+            <a:alphaModFix/>
+          </a:blip>
+          <a:stretch>
+            <a:fillRect/>
+          </a:stretch>
+        </p:blipFill>
+        <p:spPr>
+          <a:xfrm>
+            <a:off x="2876124" y="1156923"/>
+            <a:ext cx="3391749" cy="3125374"/>
+          </a:xfrm>
+          <a:prstGeom prst="rect">
+            <a:avLst/>
+          </a:prstGeom>
+          <a:noFill/>
+          <a:ln>
+            <a:noFill/>
+          </a:ln>
+        </p:spPr>
+      </p:pic>
+      <p:pic>
+        <p:nvPicPr>
+          <p:cNvPr id="204" name="Shape 204"/>
+          <p:cNvPicPr preferRelativeResize="0"/>
+          <p:nvPr/>
+        </p:nvPicPr>
+        <p:blipFill>
+          <a:blip r:embed="rId4">
+            <a:alphaModFix/>
+          </a:blip>
+          <a:stretch>
+            <a:fillRect/>
+          </a:stretch>
+        </p:blipFill>
+        <p:spPr>
+          <a:xfrm>
+            <a:off x="3029675" y="4514050"/>
+            <a:ext cx="3633349" cy="336099"/>
+          </a:xfrm>
+          <a:prstGeom prst="rect">
+            <a:avLst/>
+          </a:prstGeom>
+          <a:noFill/>
+          <a:ln>
+            <a:noFill/>
+          </a:ln>
+        </p:spPr>
+      </p:pic>
+    </p:spTree>
+  </p:cSld>
+  <p:clrMapOvr>
+    <a:masterClrMapping/>
+  </p:clrMapOvr>
+</p:sld>
+</file>
+
+<file path=ppt/slides/slide21.xml><?xml version="1.0" encoding="utf-8"?>
+<p:sld xmlns:a="http://schemas.openxmlformats.org/drawingml/2006/main" xmlns:r="http://schemas.openxmlformats.org/officeDocument/2006/relationships" xmlns:mc="http://schemas.openxmlformats.org/markup-compatibility/2006" xmlns:mv="urn:schemas-microsoft-com:mac:vml" xmlns:p="http://schemas.openxmlformats.org/presentationml/2006/main" xmlns:c="http://schemas.openxmlformats.org/drawingml/2006/chart" xmlns:dgm="http://schemas.openxmlformats.org/drawingml/2006/diagram" xmlns:o="urn:schemas-microsoft-com:office:office" xmlns:v="urn:schemas-microsoft-com:vml" xmlns:pvml="urn:schemas-microsoft-com:office:powerpoint" xmlns:com="http://schemas.openxmlformats.org/drawingml/2006/compatibility" xmlns:p14="http://schemas.microsoft.com/office/powerpoint/2010/main">
+  <p:cSld>
+    <p:spTree>
+      <p:nvGrpSpPr>
+        <p:cNvPr id="208" name="Shape 208"/>
+        <p:cNvGrpSpPr/>
+        <p:nvPr/>
+      </p:nvGrpSpPr>
+      <p:grpSpPr>
+        <a:xfrm>
+          <a:off x="0" y="0"/>
+          <a:ext cx="0" cy="0"/>
+          <a:chOff x="0" y="0"/>
+          <a:chExt cx="0" cy="0"/>
+        </a:xfrm>
+      </p:grpSpPr>
+      <p:sp>
+        <p:nvSpPr>
+          <p:cNvPr id="209" name="Shape 209"/>
+          <p:cNvSpPr txBox="1"/>
+          <p:nvPr>
+            <p:ph type="title"/>
+          </p:nvPr>
+        </p:nvSpPr>
+        <p:spPr>
+          <a:xfrm>
+            <a:off x="1705800" y="1917300"/>
+            <a:ext cx="5732400" cy="1308900"/>
+          </a:xfrm>
+          <a:prstGeom prst="rect">
+            <a:avLst/>
+          </a:prstGeom>
+        </p:spPr>
+        <p:txBody>
+          <a:bodyPr anchorCtr="0" anchor="t" bIns="91425" lIns="91425" rIns="91425" tIns="91425">
+            <a:noAutofit/>
+          </a:bodyPr>
+          <a:lstStyle/>
+          <a:p>
+            <a:pPr lvl="0" algn="ctr">
+              <a:spcBef>
+                <a:spcPts val="0"/>
+              </a:spcBef>
+              <a:buNone/>
+            </a:pPr>
+            <a:r>
+              <a:rPr lang="en" sz="6000" u="sng"/>
+              <a:t>THANK YOU</a:t>
+            </a:r>
+          </a:p>
+        </p:txBody>
+      </p:sp>
+    </p:spTree>
+  </p:cSld>
+  <p:clrMapOvr>
+    <a:masterClrMapping/>
+  </p:clrMapOvr>
+</p:sld>
+</file>
+
 <file path=ppt/slides/slide3.xml><?xml version="1.0" encoding="utf-8"?>
 <p:sld xmlns:a="http://schemas.openxmlformats.org/drawingml/2006/main" xmlns:r="http://schemas.openxmlformats.org/officeDocument/2006/relationships" xmlns:mc="http://schemas.openxmlformats.org/markup-compatibility/2006" xmlns:mv="urn:schemas-microsoft-com:mac:vml" xmlns:p="http://schemas.openxmlformats.org/presentationml/2006/main" xmlns:c="http://schemas.openxmlformats.org/drawingml/2006/chart" xmlns:dgm="http://schemas.openxmlformats.org/drawingml/2006/diagram" xmlns:o="urn:schemas-microsoft-com:office:office" xmlns:v="urn:schemas-microsoft-com:vml" xmlns:pvml="urn:schemas-microsoft-com:office:powerpoint" xmlns:com="http://schemas.openxmlformats.org/drawingml/2006/compatibility" xmlns:p14="http://schemas.microsoft.com/office/powerpoint/2010/main">
   <p:cSld>
@@ -6382,6 +10271,24 @@
           </a:bodyPr>
           <a:lstStyle/>
           <a:p>
+            <a:pPr lvl="0" marR="0" rtl="0" algn="l">
+              <a:lnSpc>
+                <a:spcPct val="100000"/>
+              </a:lnSpc>
+              <a:spcBef>
+                <a:spcPts val="0"/>
+              </a:spcBef>
+              <a:spcAft>
+                <a:spcPts val="100"/>
+              </a:spcAft>
+              <a:buNone/>
+            </a:pPr>
+            <a:r>
+              <a:t/>
+            </a:r>
+            <a:endParaRPr sz="1600"/>
+          </a:p>
+          <a:p>
             <a:pPr indent="-330200" lvl="0" marL="457200" marR="0" rtl="0" algn="l">
               <a:lnSpc>
                 <a:spcPct val="100000"/>
@@ -6396,15 +10303,15 @@
             </a:pPr>
             <a:r>
               <a:rPr b="1" lang="en"/>
-              <a:t>On and Off -</a:t>
-            </a:r>
-            <a:r>
-              <a:rPr b="1" lang="en" sz="1600"/>
-              <a:t> </a:t>
+              <a:t>Volume (UP, DOWN)</a:t>
+            </a:r>
+            <a:r>
+              <a:rPr lang="en"/>
+              <a:t> -</a:t>
             </a:r>
             <a:r>
               <a:rPr lang="en" sz="1600"/>
-              <a:t>Turn MP3 Player on and off.</a:t>
+              <a:t> Add Or Subtract a value in certain Register.</a:t>
             </a:r>
           </a:p>
           <a:p>
@@ -6422,15 +10329,23 @@
             </a:pPr>
             <a:r>
               <a:rPr b="1" lang="en"/>
-              <a:t>Volume (UP, DOWN)</a:t>
-            </a:r>
-            <a:r>
-              <a:rPr lang="en"/>
-              <a:t> -</a:t>
+              <a:t>Forward</a:t>
+            </a:r>
+            <a:r>
+              <a:rPr lang="en"/>
+              <a:t>, </a:t>
+            </a:r>
+            <a:r>
+              <a:rPr b="1" lang="en"/>
+              <a:t>Backward</a:t>
+            </a:r>
+            <a:r>
+              <a:rPr lang="en"/>
+              <a:t> </a:t>
             </a:r>
             <a:r>
               <a:rPr lang="en" sz="1600"/>
-              <a:t> Add Or Subtract a value in certain Register.</a:t>
+              <a:t>- Increase the index of song no.</a:t>
             </a:r>
           </a:p>
           <a:p>
@@ -6448,23 +10363,11 @@
             </a:pPr>
             <a:r>
               <a:rPr b="1" lang="en"/>
-              <a:t>Forward</a:t>
-            </a:r>
-            <a:r>
-              <a:rPr lang="en"/>
-              <a:t>, </a:t>
-            </a:r>
-            <a:r>
-              <a:rPr b="1" lang="en"/>
-              <a:t>Backward</a:t>
-            </a:r>
-            <a:r>
-              <a:rPr lang="en"/>
-              <a:t> </a:t>
+              <a:t>Play and Pause</a:t>
             </a:r>
             <a:r>
               <a:rPr lang="en" sz="1600"/>
-              <a:t>- Increase the index of song no.</a:t>
+              <a:t> - A flag register, true when song is being played false otherwise.</a:t>
             </a:r>
           </a:p>
           <a:p>
@@ -6482,11 +10385,15 @@
             </a:pPr>
             <a:r>
               <a:rPr b="1" lang="en"/>
-              <a:t>Play and Pause</a:t>
+              <a:t>Rewind</a:t>
+            </a:r>
+            <a:r>
+              <a:rPr lang="en"/>
+              <a:t> -</a:t>
             </a:r>
             <a:r>
               <a:rPr lang="en" sz="1600"/>
-              <a:t> - A flag register, true when song is being played false otherwise.</a:t>
+              <a:t> Go back to particular time in song.</a:t>
             </a:r>
           </a:p>
           <a:p>
@@ -6504,7 +10411,7 @@
             </a:pPr>
             <a:r>
               <a:rPr b="1" lang="en"/>
-              <a:t>Rewind</a:t>
+              <a:t>Shuffle</a:t>
             </a:r>
             <a:r>
               <a:rPr lang="en"/>
@@ -6512,7 +10419,7 @@
             </a:r>
             <a:r>
               <a:rPr lang="en" sz="1600"/>
-              <a:t> Go back to particular time in song.</a:t>
+              <a:t> Play a random playlist.</a:t>
             </a:r>
           </a:p>
           <a:p>
@@ -6530,15 +10437,15 @@
             </a:pPr>
             <a:r>
               <a:rPr b="1" lang="en"/>
-              <a:t>Shuffle</a:t>
-            </a:r>
-            <a:r>
-              <a:rPr lang="en"/>
-              <a:t> -</a:t>
+              <a:t>Most played</a:t>
+            </a:r>
+            <a:r>
+              <a:rPr b="1" lang="en" sz="1600"/>
+              <a:t> </a:t>
             </a:r>
             <a:r>
               <a:rPr lang="en" sz="1600"/>
-              <a:t> Play a random playlist.</a:t>
+              <a:t>- Play the most played song.</a:t>
             </a:r>
           </a:p>
           <a:p>
@@ -6556,15 +10463,15 @@
             </a:pPr>
             <a:r>
               <a:rPr b="1" lang="en"/>
-              <a:t>Most played</a:t>
-            </a:r>
-            <a:r>
-              <a:rPr b="1" lang="en" sz="1600"/>
-              <a:t> </a:t>
+              <a:t>Loop</a:t>
+            </a:r>
+            <a:r>
+              <a:rPr lang="en"/>
+              <a:t> -</a:t>
             </a:r>
             <a:r>
               <a:rPr lang="en" sz="1600"/>
-              <a:t>- Play the most played song.</a:t>
+              <a:t> We can keep playing a particular song in a loop.</a:t>
             </a:r>
           </a:p>
           <a:p>
@@ -6582,15 +10489,15 @@
             </a:pPr>
             <a:r>
               <a:rPr b="1" lang="en"/>
-              <a:t>Loop</a:t>
-            </a:r>
-            <a:r>
-              <a:rPr lang="en"/>
-              <a:t> -</a:t>
+              <a:t>Up and Down</a:t>
+            </a:r>
+            <a:r>
+              <a:rPr b="1" lang="en" sz="1600"/>
+              <a:t> - </a:t>
             </a:r>
             <a:r>
               <a:rPr lang="en" sz="1600"/>
-              <a:t> We can keep playing a particular song in a loop.</a:t>
+              <a:t>Scroll through song list.</a:t>
             </a:r>
           </a:p>
           <a:p>
@@ -6608,15 +10515,15 @@
             </a:pPr>
             <a:r>
               <a:rPr b="1" lang="en"/>
-              <a:t>Up and Down</a:t>
+              <a:t>Add song</a:t>
             </a:r>
             <a:r>
               <a:rPr b="1" lang="en" sz="1600"/>
-              <a:t> - </a:t>
+              <a:t> -</a:t>
             </a:r>
             <a:r>
               <a:rPr lang="en" sz="1600"/>
-              <a:t>Scroll through song list.</a:t>
+              <a:t> Add a particular song </a:t>
             </a:r>
           </a:p>
           <a:p>
@@ -6634,54 +10541,6 @@
             </a:pPr>
             <a:r>
               <a:rPr b="1" lang="en"/>
-              <a:t>Playlist</a:t>
-            </a:r>
-            <a:r>
-              <a:rPr lang="en" sz="1600"/>
-              <a:t> - Create a sequence of songs.</a:t>
-            </a:r>
-          </a:p>
-          <a:p>
-            <a:pPr indent="-330200" lvl="0" marL="457200" marR="0" rtl="0" algn="l">
-              <a:lnSpc>
-                <a:spcPct val="100000"/>
-              </a:lnSpc>
-              <a:spcBef>
-                <a:spcPts val="0"/>
-              </a:spcBef>
-              <a:spcAft>
-                <a:spcPts val="100"/>
-              </a:spcAft>
-              <a:buSzPct val="100000"/>
-            </a:pPr>
-            <a:r>
-              <a:rPr b="1" lang="en"/>
-              <a:t>Add song</a:t>
-            </a:r>
-            <a:r>
-              <a:rPr b="1" lang="en" sz="1600"/>
-              <a:t> -</a:t>
-            </a:r>
-            <a:r>
-              <a:rPr lang="en" sz="1600"/>
-              <a:t> Add a particular song to a playlist</a:t>
-            </a:r>
-          </a:p>
-          <a:p>
-            <a:pPr indent="-330200" lvl="0" marL="457200" marR="0" rtl="0" algn="l">
-              <a:lnSpc>
-                <a:spcPct val="100000"/>
-              </a:lnSpc>
-              <a:spcBef>
-                <a:spcPts val="0"/>
-              </a:spcBef>
-              <a:spcAft>
-                <a:spcPts val="100"/>
-              </a:spcAft>
-              <a:buSzPct val="100000"/>
-            </a:pPr>
-            <a:r>
-              <a:rPr b="1" lang="en"/>
               <a:t>Delete song</a:t>
             </a:r>
             <a:r>
@@ -6690,7 +10549,7 @@
             </a:r>
             <a:r>
               <a:rPr lang="en" sz="1600"/>
-              <a:t>Empty the memory location by toggling it to 0.</a:t>
+              <a:t>Empty the memory location .</a:t>
             </a:r>
           </a:p>
         </p:txBody>
@@ -6994,7 +10853,7 @@
             </a:pPr>
             <a:r>
               <a:rPr b="1" lang="en"/>
-              <a:t>Stack registers</a:t>
+              <a:t>register</a:t>
             </a:r>
             <a:r>
               <a:rPr lang="en"/>
@@ -7015,7 +10874,7 @@
             </a:pPr>
             <a:r>
               <a:rPr b="1" lang="en"/>
-              <a:t>Flag register or PSW</a:t>
+              <a:t>Flag register or PP</a:t>
             </a:r>
             <a:r>
               <a:rPr lang="en"/>
@@ -7220,34 +11079,11 @@
             <a:r>
               <a:t/>
             </a:r>
-            <a:endParaRPr sz="1400">
+            <a:endParaRPr sz="1600">
               <a:solidFill>
                 <a:srgbClr val="000000"/>
               </a:solidFill>
             </a:endParaRPr>
-          </a:p>
-          <a:p>
-            <a:pPr indent="-330200" lvl="0" marL="457200" rtl="0">
-              <a:spcBef>
-                <a:spcPts val="0"/>
-              </a:spcBef>
-              <a:spcAft>
-                <a:spcPts val="0"/>
-              </a:spcAft>
-              <a:buClr>
-                <a:srgbClr val="000000"/>
-              </a:buClr>
-              <a:buSzPct val="100000"/>
-              <a:buAutoNum type="arabicPeriod"/>
-            </a:pPr>
-            <a:r>
-              <a:rPr lang="en" sz="1600">
-                <a:solidFill>
-                  <a:srgbClr val="000000"/>
-                </a:solidFill>
-              </a:rPr>
-              <a:t>On and Off</a:t>
-            </a:r>
           </a:p>
           <a:p>
             <a:pPr indent="-330200" lvl="0" marL="457200" rtl="0">
@@ -7500,7 +11336,7 @@
                   <a:srgbClr val="000000"/>
                 </a:solidFill>
               </a:rPr>
-              <a:t>Loop</a:t>
+              <a:t>Loop.</a:t>
             </a:r>
           </a:p>
           <a:p>
@@ -7523,7 +11359,7 @@
                   <a:srgbClr val="000000"/>
                 </a:solidFill>
               </a:rPr>
-              <a:t>Playlist</a:t>
+              <a:t>Play current song.</a:t>
             </a:r>
           </a:p>
           <a:p>
@@ -7960,21 +11796,6 @@
             </a:pPr>
             <a:r>
               <a:rPr b="1" lang="en"/>
-              <a:t>Input/Output </a:t>
-            </a:r>
-            <a:r>
-              <a:rPr lang="en"/>
-              <a:t>instructions.</a:t>
-            </a:r>
-          </a:p>
-          <a:p>
-            <a:pPr indent="-228600" lvl="0" marL="457200" rtl="0">
-              <a:spcBef>
-                <a:spcPts val="0"/>
-              </a:spcBef>
-            </a:pPr>
-            <a:r>
-              <a:rPr b="1" lang="en"/>
               <a:t>Loop Control</a:t>
             </a:r>
             <a:r>
@@ -8206,7 +12027,7 @@
             </a:pPr>
             <a:r>
               <a:rPr lang="en" sz="1600"/>
-              <a:t>Song_Duration(in seconds) - integer</a:t>
+              <a:t>Song_Duration(in minutes) - integer</a:t>
             </a:r>
           </a:p>
           <a:p>
@@ -8274,6 +12095,285 @@
 </file>
 
 <file path=ppt/theme/theme1.xml><?xml version="1.0" encoding="utf-8"?>
+<a:theme xmlns:a="http://schemas.openxmlformats.org/drawingml/2006/main" xmlns:r="http://schemas.openxmlformats.org/officeDocument/2006/relationships" name="Custom Theme">
+  <a:themeElements>
+    <a:clrScheme name="Default">
+      <a:dk1>
+        <a:srgbClr val="000000"/>
+      </a:dk1>
+      <a:lt1>
+        <a:srgbClr val="FFFFFF"/>
+      </a:lt1>
+      <a:dk2>
+        <a:srgbClr val="158158"/>
+      </a:dk2>
+      <a:lt2>
+        <a:srgbClr val="F3F3F3"/>
+      </a:lt2>
+      <a:accent1>
+        <a:srgbClr val="058DC7"/>
+      </a:accent1>
+      <a:accent2>
+        <a:srgbClr val="50B432"/>
+      </a:accent2>
+      <a:accent3>
+        <a:srgbClr val="ED561B"/>
+      </a:accent3>
+      <a:accent4>
+        <a:srgbClr val="EDEF00"/>
+      </a:accent4>
+      <a:accent5>
+        <a:srgbClr val="24CBE5"/>
+      </a:accent5>
+      <a:accent6>
+        <a:srgbClr val="64E572"/>
+      </a:accent6>
+      <a:hlink>
+        <a:srgbClr val="2200CC"/>
+      </a:hlink>
+      <a:folHlink>
+        <a:srgbClr val="551A8B"/>
+      </a:folHlink>
+    </a:clrScheme>
+    <a:fontScheme name="Office">
+      <a:majorFont>
+        <a:latin typeface="Arial"/>
+        <a:ea typeface=""/>
+        <a:cs typeface=""/>
+        <a:font script="Jpan" typeface="ＭＳ Ｐゴシック"/>
+        <a:font script="Hang" typeface="맑은 고딕"/>
+        <a:font script="Hans" typeface="宋体"/>
+        <a:font script="Hant" typeface="新細明體"/>
+        <a:font script="Arab" typeface="Times New Roman"/>
+        <a:font script="Hebr" typeface="Times New Roman"/>
+        <a:font script="Thai" typeface="Angsana New"/>
+        <a:font script="Ethi" typeface="Nyala"/>
+        <a:font script="Beng" typeface="Vrinda"/>
+        <a:font script="Gujr" typeface="Shruti"/>
+        <a:font script="Khmr" typeface="MoolBoran"/>
+        <a:font script="Knda" typeface="Tunga"/>
+        <a:font script="Guru" typeface="Raavi"/>
+        <a:font script="Cans" typeface="Euphemia"/>
+        <a:font script="Cher" typeface="Plantagenet Cherokee"/>
+        <a:font script="Yiii" typeface="Microsoft Yi Baiti"/>
+        <a:font script="Tibt" typeface="Microsoft Himalaya"/>
+        <a:font script="Thaa" typeface="MV Boli"/>
+        <a:font script="Deva" typeface="Mangal"/>
+        <a:font script="Telu" typeface="Gautami"/>
+        <a:font script="Taml" typeface="Latha"/>
+        <a:font script="Syrc" typeface="Estrangelo Edessa"/>
+        <a:font script="Orya" typeface="Kalinga"/>
+        <a:font script="Mlym" typeface="Kartika"/>
+        <a:font script="Laoo" typeface="DokChampa"/>
+        <a:font script="Sinh" typeface="Iskoola Pota"/>
+        <a:font script="Mong" typeface="Mongolian Baiti"/>
+        <a:font script="Viet" typeface="Times New Roman"/>
+        <a:font script="Uigh" typeface="Microsoft Uighur"/>
+        <a:font script="Geor" typeface="Sylfaen"/>
+      </a:majorFont>
+      <a:minorFont>
+        <a:latin typeface="Arial"/>
+        <a:ea typeface=""/>
+        <a:cs typeface=""/>
+        <a:font script="Jpan" typeface="ＭＳ Ｐゴシック"/>
+        <a:font script="Hang" typeface="맑은 고딕"/>
+        <a:font script="Hans" typeface="宋体"/>
+        <a:font script="Hant" typeface="新細明體"/>
+        <a:font script="Arab" typeface="Arial"/>
+        <a:font script="Hebr" typeface="Arial"/>
+        <a:font script="Thai" typeface="Cordia New"/>
+        <a:font script="Ethi" typeface="Nyala"/>
+        <a:font script="Beng" typeface="Vrinda"/>
+        <a:font script="Gujr" typeface="Shruti"/>
+        <a:font script="Khmr" typeface="DaunPenh"/>
+        <a:font script="Knda" typeface="Tunga"/>
+        <a:font script="Guru" typeface="Raavi"/>
+        <a:font script="Cans" typeface="Euphemia"/>
+        <a:font script="Cher" typeface="Plantagenet Cherokee"/>
+        <a:font script="Yiii" typeface="Microsoft Yi Baiti"/>
+        <a:font script="Tibt" typeface="Microsoft Himalaya"/>
+        <a:font script="Thaa" typeface="MV Boli"/>
+        <a:font script="Deva" typeface="Mangal"/>
+        <a:font script="Telu" typeface="Gautami"/>
+        <a:font script="Taml" typeface="Latha"/>
+        <a:font script="Syrc" typeface="Estrangelo Edessa"/>
+        <a:font script="Orya" typeface="Kalinga"/>
+        <a:font script="Mlym" typeface="Kartika"/>
+        <a:font script="Laoo" typeface="DokChampa"/>
+        <a:font script="Sinh" typeface="Iskoola Pota"/>
+        <a:font script="Mong" typeface="Mongolian Baiti"/>
+        <a:font script="Viet" typeface="Arial"/>
+        <a:font script="Uigh" typeface="Microsoft Uighur"/>
+        <a:font script="Geor" typeface="Sylfaen"/>
+      </a:minorFont>
+    </a:fontScheme>
+    <a:fmtScheme name="Office">
+      <a:fillStyleLst>
+        <a:solidFill>
+          <a:schemeClr val="phClr"/>
+        </a:solidFill>
+        <a:gradFill rotWithShape="1">
+          <a:gsLst>
+            <a:gs pos="0">
+              <a:schemeClr val="phClr">
+                <a:tint val="50000"/>
+                <a:satMod val="300000"/>
+              </a:schemeClr>
+            </a:gs>
+            <a:gs pos="35000">
+              <a:schemeClr val="phClr">
+                <a:tint val="37000"/>
+                <a:satMod val="300000"/>
+              </a:schemeClr>
+            </a:gs>
+            <a:gs pos="100000">
+              <a:schemeClr val="phClr">
+                <a:tint val="15000"/>
+                <a:satMod val="350000"/>
+              </a:schemeClr>
+            </a:gs>
+          </a:gsLst>
+          <a:lin ang="16200000" scaled="1"/>
+        </a:gradFill>
+        <a:gradFill rotWithShape="1">
+          <a:gsLst>
+            <a:gs pos="0">
+              <a:schemeClr val="phClr">
+                <a:tint val="100000"/>
+                <a:shade val="100000"/>
+                <a:satMod val="130000"/>
+              </a:schemeClr>
+            </a:gs>
+            <a:gs pos="100000">
+              <a:schemeClr val="phClr">
+                <a:tint val="50000"/>
+                <a:shade val="100000"/>
+                <a:satMod val="350000"/>
+              </a:schemeClr>
+            </a:gs>
+          </a:gsLst>
+          <a:lin ang="16200000" scaled="0"/>
+        </a:gradFill>
+      </a:fillStyleLst>
+      <a:lnStyleLst>
+        <a:ln w="9525" cap="flat" cmpd="sng" algn="ctr">
+          <a:solidFill>
+            <a:schemeClr val="phClr">
+              <a:shade val="95000"/>
+              <a:satMod val="105000"/>
+            </a:schemeClr>
+          </a:solidFill>
+          <a:prstDash val="solid"/>
+        </a:ln>
+        <a:ln w="25400" cap="flat" cmpd="sng" algn="ctr">
+          <a:solidFill>
+            <a:schemeClr val="phClr"/>
+          </a:solidFill>
+          <a:prstDash val="solid"/>
+        </a:ln>
+        <a:ln w="38100" cap="flat" cmpd="sng" algn="ctr">
+          <a:solidFill>
+            <a:schemeClr val="phClr"/>
+          </a:solidFill>
+          <a:prstDash val="solid"/>
+        </a:ln>
+      </a:lnStyleLst>
+      <a:effectStyleLst>
+        <a:effectStyle>
+          <a:effectLst>
+            <a:outerShdw blurRad="40000" dist="20000" dir="5400000" rotWithShape="0">
+              <a:srgbClr val="000000">
+                <a:alpha val="38000"/>
+              </a:srgbClr>
+            </a:outerShdw>
+          </a:effectLst>
+        </a:effectStyle>
+        <a:effectStyle>
+          <a:effectLst>
+            <a:outerShdw blurRad="40000" dist="23000" dir="5400000" rotWithShape="0">
+              <a:srgbClr val="000000">
+                <a:alpha val="35000"/>
+              </a:srgbClr>
+            </a:outerShdw>
+          </a:effectLst>
+        </a:effectStyle>
+        <a:effectStyle>
+          <a:effectLst>
+            <a:outerShdw blurRad="40000" dist="23000" dir="5400000" rotWithShape="0">
+              <a:srgbClr val="000000">
+                <a:alpha val="35000"/>
+              </a:srgbClr>
+            </a:outerShdw>
+          </a:effectLst>
+          <a:scene3d>
+            <a:camera prst="orthographicFront">
+              <a:rot lat="0" lon="0" rev="0"/>
+            </a:camera>
+            <a:lightRig rig="threePt" dir="t">
+              <a:rot lat="0" lon="0" rev="1200000"/>
+            </a:lightRig>
+          </a:scene3d>
+          <a:sp3d>
+            <a:bevelT w="63500" h="25400"/>
+          </a:sp3d>
+        </a:effectStyle>
+      </a:effectStyleLst>
+      <a:bgFillStyleLst>
+        <a:solidFill>
+          <a:schemeClr val="phClr"/>
+        </a:solidFill>
+        <a:gradFill rotWithShape="1">
+          <a:gsLst>
+            <a:gs pos="0">
+              <a:schemeClr val="phClr">
+                <a:tint val="40000"/>
+                <a:satMod val="350000"/>
+              </a:schemeClr>
+            </a:gs>
+            <a:gs pos="40000">
+              <a:schemeClr val="phClr">
+                <a:tint val="45000"/>
+                <a:shade val="99000"/>
+                <a:satMod val="350000"/>
+              </a:schemeClr>
+            </a:gs>
+            <a:gs pos="100000">
+              <a:schemeClr val="phClr">
+                <a:shade val="20000"/>
+                <a:satMod val="255000"/>
+              </a:schemeClr>
+            </a:gs>
+          </a:gsLst>
+          <a:path path="circle">
+            <a:fillToRect l="50000" t="-80000" r="50000" b="180000"/>
+          </a:path>
+        </a:gradFill>
+        <a:gradFill rotWithShape="1">
+          <a:gsLst>
+            <a:gs pos="0">
+              <a:schemeClr val="phClr">
+                <a:tint val="80000"/>
+                <a:satMod val="300000"/>
+              </a:schemeClr>
+            </a:gs>
+            <a:gs pos="100000">
+              <a:schemeClr val="phClr">
+                <a:shade val="30000"/>
+                <a:satMod val="200000"/>
+              </a:schemeClr>
+            </a:gs>
+          </a:gsLst>
+          <a:path path="circle">
+            <a:fillToRect l="50000" t="50000" r="50000" b="50000"/>
+          </a:path>
+        </a:gradFill>
+      </a:bgFillStyleLst>
+    </a:fmtScheme>
+  </a:themeElements>
+</a:theme>
+</file>
+
+<file path=ppt/theme/theme2.xml><?xml version="1.0" encoding="utf-8"?>
 <a:theme xmlns:a="http://schemas.openxmlformats.org/drawingml/2006/main" xmlns:r="http://schemas.openxmlformats.org/officeDocument/2006/relationships" name="beach-day">
   <a:themeElements>
     <a:clrScheme name="Beach Day">
@@ -8550,283 +12650,4 @@
     </a:fmtScheme>
   </a:themeElements>
 </a:theme>
-</file>
-
-<file path=ppt/theme/theme2.xml><?xml version="1.0" encoding="utf-8"?>
-<a:theme xmlns:a="http://schemas.openxmlformats.org/drawingml/2006/main" xmlns:r="http://schemas.openxmlformats.org/officeDocument/2006/relationships" name="Custom Theme">
-  <a:themeElements>
-    <a:clrScheme name="Default">
-      <a:dk1>
-        <a:srgbClr val="000000"/>
-      </a:dk1>
-      <a:lt1>
-        <a:srgbClr val="FFFFFF"/>
-      </a:lt1>
-      <a:dk2>
-        <a:srgbClr val="158158"/>
-      </a:dk2>
-      <a:lt2>
-        <a:srgbClr val="F3F3F3"/>
-      </a:lt2>
-      <a:accent1>
-        <a:srgbClr val="058DC7"/>
-      </a:accent1>
-      <a:accent2>
-        <a:srgbClr val="50B432"/>
-      </a:accent2>
-      <a:accent3>
-        <a:srgbClr val="ED561B"/>
-      </a:accent3>
-      <a:accent4>
-        <a:srgbClr val="EDEF00"/>
-      </a:accent4>
-      <a:accent5>
-        <a:srgbClr val="24CBE5"/>
-      </a:accent5>
-      <a:accent6>
-        <a:srgbClr val="64E572"/>
-      </a:accent6>
-      <a:hlink>
-        <a:srgbClr val="2200CC"/>
-      </a:hlink>
-      <a:folHlink>
-        <a:srgbClr val="551A8B"/>
-      </a:folHlink>
-    </a:clrScheme>
-    <a:fontScheme name="Office">
-      <a:majorFont>
-        <a:latin typeface="Arial"/>
-        <a:ea typeface=""/>
-        <a:cs typeface=""/>
-        <a:font script="Jpan" typeface="ＭＳ Ｐゴシック"/>
-        <a:font script="Hang" typeface="맑은 고딕"/>
-        <a:font script="Hans" typeface="宋体"/>
-        <a:font script="Hant" typeface="新細明體"/>
-        <a:font script="Arab" typeface="Times New Roman"/>
-        <a:font script="Hebr" typeface="Times New Roman"/>
-        <a:font script="Thai" typeface="Angsana New"/>
-        <a:font script="Ethi" typeface="Nyala"/>
-        <a:font script="Beng" typeface="Vrinda"/>
-        <a:font script="Gujr" typeface="Shruti"/>
-        <a:font script="Khmr" typeface="MoolBoran"/>
-        <a:font script="Knda" typeface="Tunga"/>
-        <a:font script="Guru" typeface="Raavi"/>
-        <a:font script="Cans" typeface="Euphemia"/>
-        <a:font script="Cher" typeface="Plantagenet Cherokee"/>
-        <a:font script="Yiii" typeface="Microsoft Yi Baiti"/>
-        <a:font script="Tibt" typeface="Microsoft Himalaya"/>
-        <a:font script="Thaa" typeface="MV Boli"/>
-        <a:font script="Deva" typeface="Mangal"/>
-        <a:font script="Telu" typeface="Gautami"/>
-        <a:font script="Taml" typeface="Latha"/>
-        <a:font script="Syrc" typeface="Estrangelo Edessa"/>
-        <a:font script="Orya" typeface="Kalinga"/>
-        <a:font script="Mlym" typeface="Kartika"/>
-        <a:font script="Laoo" typeface="DokChampa"/>
-        <a:font script="Sinh" typeface="Iskoola Pota"/>
-        <a:font script="Mong" typeface="Mongolian Baiti"/>
-        <a:font script="Viet" typeface="Times New Roman"/>
-        <a:font script="Uigh" typeface="Microsoft Uighur"/>
-        <a:font script="Geor" typeface="Sylfaen"/>
-      </a:majorFont>
-      <a:minorFont>
-        <a:latin typeface="Arial"/>
-        <a:ea typeface=""/>
-        <a:cs typeface=""/>
-        <a:font script="Jpan" typeface="ＭＳ Ｐゴシック"/>
-        <a:font script="Hang" typeface="맑은 고딕"/>
-        <a:font script="Hans" typeface="宋体"/>
-        <a:font script="Hant" typeface="新細明體"/>
-        <a:font script="Arab" typeface="Arial"/>
-        <a:font script="Hebr" typeface="Arial"/>
-        <a:font script="Thai" typeface="Cordia New"/>
-        <a:font script="Ethi" typeface="Nyala"/>
-        <a:font script="Beng" typeface="Vrinda"/>
-        <a:font script="Gujr" typeface="Shruti"/>
-        <a:font script="Khmr" typeface="DaunPenh"/>
-        <a:font script="Knda" typeface="Tunga"/>
-        <a:font script="Guru" typeface="Raavi"/>
-        <a:font script="Cans" typeface="Euphemia"/>
-        <a:font script="Cher" typeface="Plantagenet Cherokee"/>
-        <a:font script="Yiii" typeface="Microsoft Yi Baiti"/>
-        <a:font script="Tibt" typeface="Microsoft Himalaya"/>
-        <a:font script="Thaa" typeface="MV Boli"/>
-        <a:font script="Deva" typeface="Mangal"/>
-        <a:font script="Telu" typeface="Gautami"/>
-        <a:font script="Taml" typeface="Latha"/>
-        <a:font script="Syrc" typeface="Estrangelo Edessa"/>
-        <a:font script="Orya" typeface="Kalinga"/>
-        <a:font script="Mlym" typeface="Kartika"/>
-        <a:font script="Laoo" typeface="DokChampa"/>
-        <a:font script="Sinh" typeface="Iskoola Pota"/>
-        <a:font script="Mong" typeface="Mongolian Baiti"/>
-        <a:font script="Viet" typeface="Arial"/>
-        <a:font script="Uigh" typeface="Microsoft Uighur"/>
-        <a:font script="Geor" typeface="Sylfaen"/>
-      </a:minorFont>
-    </a:fontScheme>
-    <a:fmtScheme name="Office">
-      <a:fillStyleLst>
-        <a:solidFill>
-          <a:schemeClr val="phClr"/>
-        </a:solidFill>
-        <a:gradFill rotWithShape="1">
-          <a:gsLst>
-            <a:gs pos="0">
-              <a:schemeClr val="phClr">
-                <a:tint val="50000"/>
-                <a:satMod val="300000"/>
-              </a:schemeClr>
-            </a:gs>
-            <a:gs pos="35000">
-              <a:schemeClr val="phClr">
-                <a:tint val="37000"/>
-                <a:satMod val="300000"/>
-              </a:schemeClr>
-            </a:gs>
-            <a:gs pos="100000">
-              <a:schemeClr val="phClr">
-                <a:tint val="15000"/>
-                <a:satMod val="350000"/>
-              </a:schemeClr>
-            </a:gs>
-          </a:gsLst>
-          <a:lin ang="16200000" scaled="1"/>
-        </a:gradFill>
-        <a:gradFill rotWithShape="1">
-          <a:gsLst>
-            <a:gs pos="0">
-              <a:schemeClr val="phClr">
-                <a:tint val="100000"/>
-                <a:shade val="100000"/>
-                <a:satMod val="130000"/>
-              </a:schemeClr>
-            </a:gs>
-            <a:gs pos="100000">
-              <a:schemeClr val="phClr">
-                <a:tint val="50000"/>
-                <a:shade val="100000"/>
-                <a:satMod val="350000"/>
-              </a:schemeClr>
-            </a:gs>
-          </a:gsLst>
-          <a:lin ang="16200000" scaled="0"/>
-        </a:gradFill>
-      </a:fillStyleLst>
-      <a:lnStyleLst>
-        <a:ln w="9525" cap="flat" cmpd="sng" algn="ctr">
-          <a:solidFill>
-            <a:schemeClr val="phClr">
-              <a:shade val="95000"/>
-              <a:satMod val="105000"/>
-            </a:schemeClr>
-          </a:solidFill>
-          <a:prstDash val="solid"/>
-        </a:ln>
-        <a:ln w="25400" cap="flat" cmpd="sng" algn="ctr">
-          <a:solidFill>
-            <a:schemeClr val="phClr"/>
-          </a:solidFill>
-          <a:prstDash val="solid"/>
-        </a:ln>
-        <a:ln w="38100" cap="flat" cmpd="sng" algn="ctr">
-          <a:solidFill>
-            <a:schemeClr val="phClr"/>
-          </a:solidFill>
-          <a:prstDash val="solid"/>
-        </a:ln>
-      </a:lnStyleLst>
-      <a:effectStyleLst>
-        <a:effectStyle>
-          <a:effectLst>
-            <a:outerShdw blurRad="40000" dist="20000" dir="5400000" rotWithShape="0">
-              <a:srgbClr val="000000">
-                <a:alpha val="38000"/>
-              </a:srgbClr>
-            </a:outerShdw>
-          </a:effectLst>
-        </a:effectStyle>
-        <a:effectStyle>
-          <a:effectLst>
-            <a:outerShdw blurRad="40000" dist="23000" dir="5400000" rotWithShape="0">
-              <a:srgbClr val="000000">
-                <a:alpha val="35000"/>
-              </a:srgbClr>
-            </a:outerShdw>
-          </a:effectLst>
-        </a:effectStyle>
-        <a:effectStyle>
-          <a:effectLst>
-            <a:outerShdw blurRad="40000" dist="23000" dir="5400000" rotWithShape="0">
-              <a:srgbClr val="000000">
-                <a:alpha val="35000"/>
-              </a:srgbClr>
-            </a:outerShdw>
-          </a:effectLst>
-          <a:scene3d>
-            <a:camera prst="orthographicFront">
-              <a:rot lat="0" lon="0" rev="0"/>
-            </a:camera>
-            <a:lightRig rig="threePt" dir="t">
-              <a:rot lat="0" lon="0" rev="1200000"/>
-            </a:lightRig>
-          </a:scene3d>
-          <a:sp3d>
-            <a:bevelT w="63500" h="25400"/>
-          </a:sp3d>
-        </a:effectStyle>
-      </a:effectStyleLst>
-      <a:bgFillStyleLst>
-        <a:solidFill>
-          <a:schemeClr val="phClr"/>
-        </a:solidFill>
-        <a:gradFill rotWithShape="1">
-          <a:gsLst>
-            <a:gs pos="0">
-              <a:schemeClr val="phClr">
-                <a:tint val="40000"/>
-                <a:satMod val="350000"/>
-              </a:schemeClr>
-            </a:gs>
-            <a:gs pos="40000">
-              <a:schemeClr val="phClr">
-                <a:tint val="45000"/>
-                <a:shade val="99000"/>
-                <a:satMod val="350000"/>
-              </a:schemeClr>
-            </a:gs>
-            <a:gs pos="100000">
-              <a:schemeClr val="phClr">
-                <a:shade val="20000"/>
-                <a:satMod val="255000"/>
-              </a:schemeClr>
-            </a:gs>
-          </a:gsLst>
-          <a:path path="circle">
-            <a:fillToRect l="50000" t="-80000" r="50000" b="180000"/>
-          </a:path>
-        </a:gradFill>
-        <a:gradFill rotWithShape="1">
-          <a:gsLst>
-            <a:gs pos="0">
-              <a:schemeClr val="phClr">
-                <a:tint val="80000"/>
-                <a:satMod val="300000"/>
-              </a:schemeClr>
-            </a:gs>
-            <a:gs pos="100000">
-              <a:schemeClr val="phClr">
-                <a:shade val="30000"/>
-                <a:satMod val="200000"/>
-              </a:schemeClr>
-            </a:gs>
-          </a:gsLst>
-          <a:path path="circle">
-            <a:fillToRect l="50000" t="50000" r="50000" b="50000"/>
-          </a:path>
-        </a:gradFill>
-      </a:bgFillStyleLst>
-    </a:fmtScheme>
-  </a:themeElements>
-</a:theme>
 </file>
</xml_diff>